<commit_message>
Add presentation on clusters independent of AD from On-Prem to Azure Local (Part 1)
</commit_message>
<xml_diff>
--- a/HCCJP_67/presentation.pptx
+++ b/HCCJP_67/presentation.pptx
@@ -19792,8 +19792,8 @@
         </p:nvSpPr>
         <p:spPr>
           <a:xfrm>
-            <a:off x="2776680" y="1828440"/>
-            <a:ext cx="3019320" cy="10080"/>
+            <a:off x="1047600" y="2085840"/>
+            <a:ext cx="6558120" cy="9720"/>
           </a:xfrm>
           <a:custGeom>
             <a:avLst/>
@@ -19801,21 +19801,51 @@
             <a:ahLst/>
             <a:rect l="0" t="0" r="r" b="b"/>
             <a:pathLst>
-              <a:path w="8387" h="28">
+              <a:path w="18217" h="27">
                 <a:moveTo>
+                  <a:pt x="17574" y="27"/>
+                </a:moveTo>
+                <a:lnTo>
+                  <a:pt x="942" y="27"/>
+                </a:lnTo>
+                <a:lnTo>
+                  <a:pt x="942" y="0"/>
+                </a:lnTo>
+                <a:lnTo>
+                  <a:pt x="17574" y="0"/>
+                </a:lnTo>
+                <a:lnTo>
+                  <a:pt x="17574" y="27"/>
+                </a:lnTo>
+                <a:moveTo>
+                  <a:pt x="17887" y="0"/>
+                </a:moveTo>
+                <a:lnTo>
+                  <a:pt x="18217" y="0"/>
+                </a:lnTo>
+                <a:lnTo>
+                  <a:pt x="18217" y="27"/>
+                </a:lnTo>
+                <a:lnTo>
+                  <a:pt x="17887" y="27"/>
+                </a:lnTo>
+                <a:lnTo>
+                  <a:pt x="17887" y="0"/>
+                </a:lnTo>
+                <a:moveTo>
+                  <a:pt x="795" y="27"/>
+                </a:moveTo>
+                <a:lnTo>
+                  <a:pt x="0" y="27"/>
+                </a:lnTo>
+                <a:lnTo>
                   <a:pt x="0" y="0"/>
-                </a:moveTo>
-                <a:lnTo>
-                  <a:pt x="8387" y="0"/>
-                </a:lnTo>
-                <a:lnTo>
-                  <a:pt x="8387" y="28"/>
-                </a:lnTo>
-                <a:lnTo>
-                  <a:pt x="0" y="28"/>
-                </a:lnTo>
-                <a:lnTo>
-                  <a:pt x="0" y="0"/>
+                </a:lnTo>
+                <a:lnTo>
+                  <a:pt x="795" y="0"/>
+                </a:lnTo>
+                <a:lnTo>
+                  <a:pt x="795" y="27"/>
                 </a:lnTo>
                 <a:close/>
               </a:path>
@@ -19847,12 +19877,71 @@
       <p:sp>
         <p:nvSpPr>
           <p:cNvPr id="499" name=""/>
+          <p:cNvSpPr txBox="1"/>
+          <p:nvPr/>
+        </p:nvSpPr>
+        <p:spPr>
+          <a:xfrm>
+            <a:off x="1047600" y="1623960"/>
+            <a:ext cx="4536360" cy="276120"/>
+          </a:xfrm>
+          <a:prstGeom prst="rect">
+            <a:avLst/>
+          </a:prstGeom>
+          <a:noFill/>
+          <a:ln w="0">
+            <a:noFill/>
+          </a:ln>
+        </p:spPr>
+        <p:txBody>
+          <a:bodyPr wrap="none" lIns="0" rIns="0" tIns="0" bIns="0" anchor="t">
+            <a:spAutoFit/>
+          </a:bodyPr>
+          <a:p>
+            <a:r>
+              <a:rPr b="1" lang="en-US" sz="1450" strike="noStrike" u="none">
+                <a:solidFill>
+                  <a:srgbClr val="455a64"/>
+                </a:solidFill>
+                <a:effectLst/>
+                <a:uFillTx/>
+                <a:latin typeface="Meiryo"/>
+                <a:ea typeface="Meiryo"/>
+              </a:rPr>
+              <a:t>Microsoft Learn: </a:t>
+            </a:r>
+            <a:r>
+              <a:rPr b="1" lang="ja-JP" sz="1450" strike="noStrike" u="none">
+                <a:solidFill>
+                  <a:srgbClr val="455a64"/>
+                </a:solidFill>
+                <a:effectLst/>
+                <a:uFillTx/>
+                <a:latin typeface="Meiryo"/>
+                <a:ea typeface="Meiryo"/>
+              </a:rPr>
+              <a:t>フェールオーバー クラスター概要</a:t>
+            </a:r>
+            <a:endParaRPr b="0" lang="en-US" sz="1450" strike="noStrike" u="none">
+              <a:solidFill>
+                <a:srgbClr val="000000"/>
+              </a:solidFill>
+              <a:effectLst/>
+              <a:uFillTx/>
+              <a:latin typeface="Times New Roman"/>
+            </a:endParaRPr>
+          </a:p>
+        </p:txBody>
+      </p:sp>
+      <p:sp>
+        <p:nvSpPr>
+          <p:cNvPr id="500" name=""/>
           <p:cNvSpPr/>
           <p:nvPr/>
         </p:nvSpPr>
         <p:spPr>
           <a:xfrm>
-            <a:off x="847440" y="2019240"/>
+            <a:off x="847440" y="2266920"/>
             <a:ext cx="66960" cy="66960"/>
           </a:xfrm>
           <a:custGeom>
@@ -19866,7 +19955,7 @@
                   <a:pt x="186" y="93"/>
                 </a:moveTo>
                 <a:cubicBezTo>
-                  <a:pt x="186" y="106"/>
+                  <a:pt x="186" y="105"/>
                   <a:pt x="184" y="117"/>
                   <a:pt x="179" y="129"/>
                 </a:cubicBezTo>
@@ -19881,13 +19970,13 @@
                   <a:pt x="128" y="179"/>
                 </a:cubicBezTo>
                 <a:cubicBezTo>
-                  <a:pt x="117" y="184"/>
+                  <a:pt x="117" y="183"/>
                   <a:pt x="105" y="186"/>
                   <a:pt x="93" y="186"/>
                 </a:cubicBezTo>
                 <a:cubicBezTo>
                   <a:pt x="81" y="186"/>
-                  <a:pt x="69" y="184"/>
+                  <a:pt x="69" y="183"/>
                   <a:pt x="57" y="179"/>
                 </a:cubicBezTo>
                 <a:cubicBezTo>
@@ -19902,17 +19991,17 @@
                 </a:cubicBezTo>
                 <a:cubicBezTo>
                   <a:pt x="3" y="117"/>
-                  <a:pt x="0" y="106"/>
+                  <a:pt x="0" y="105"/>
                   <a:pt x="0" y="93"/>
                 </a:cubicBezTo>
                 <a:cubicBezTo>
-                  <a:pt x="0" y="81"/>
-                  <a:pt x="3" y="69"/>
-                  <a:pt x="7" y="58"/>
-                </a:cubicBezTo>
-                <a:cubicBezTo>
-                  <a:pt x="12" y="46"/>
-                  <a:pt x="19" y="36"/>
+                  <a:pt x="0" y="80"/>
+                  <a:pt x="3" y="68"/>
+                  <a:pt x="7" y="57"/>
+                </a:cubicBezTo>
+                <a:cubicBezTo>
+                  <a:pt x="12" y="45"/>
+                  <a:pt x="19" y="35"/>
                   <a:pt x="27" y="27"/>
                 </a:cubicBezTo>
                 <a:cubicBezTo>
@@ -19936,13 +20025,13 @@
                   <a:pt x="159" y="27"/>
                 </a:cubicBezTo>
                 <a:cubicBezTo>
-                  <a:pt x="168" y="36"/>
-                  <a:pt x="175" y="46"/>
-                  <a:pt x="179" y="58"/>
-                </a:cubicBezTo>
-                <a:cubicBezTo>
-                  <a:pt x="184" y="69"/>
-                  <a:pt x="186" y="81"/>
+                  <a:pt x="168" y="35"/>
+                  <a:pt x="175" y="45"/>
+                  <a:pt x="179" y="57"/>
+                </a:cubicBezTo>
+                <a:cubicBezTo>
+                  <a:pt x="184" y="68"/>
+                  <a:pt x="186" y="80"/>
                   <a:pt x="186" y="93"/>
                 </a:cubicBezTo>
                 <a:close/>
@@ -19974,14 +20063,14 @@
       </p:sp>
       <p:sp>
         <p:nvSpPr>
-          <p:cNvPr id="500" name=""/>
+          <p:cNvPr id="501" name=""/>
           <p:cNvSpPr txBox="1"/>
           <p:nvPr/>
         </p:nvSpPr>
         <p:spPr>
           <a:xfrm>
-            <a:off x="1047600" y="1623960"/>
-            <a:ext cx="4407480" cy="276120"/>
+            <a:off x="1047600" y="1881000"/>
+            <a:ext cx="5907600" cy="276120"/>
           </a:xfrm>
           <a:prstGeom prst="rect">
             <a:avLst/>
@@ -19999,18 +20088,6 @@
             <a:r>
               <a:rPr b="0" lang="en-US" sz="1450" strike="noStrike" u="none">
                 <a:solidFill>
-                  <a:srgbClr val="455a64"/>
-                </a:solidFill>
-                <a:effectLst/>
-                <a:uFillTx/>
-                <a:latin typeface="Meiryo"/>
-                <a:ea typeface="Meiryo"/>
-              </a:rPr>
-              <a:t>Microsoft Learn: </a:t>
-            </a:r>
-            <a:r>
-              <a:rPr b="0" lang="ja-JP" sz="1450" strike="noStrike" u="none">
-                <a:solidFill>
                   <a:srgbClr val="0288d1"/>
                 </a:solidFill>
                 <a:effectLst/>
@@ -20018,7 +20095,7 @@
                 <a:latin typeface="Meiryo"/>
                 <a:ea typeface="Meiryo"/>
               </a:rPr>
-              <a:t>フェールオーバー クラスター概要</a:t>
+              <a:t>https://learn.microsoft.com /windows-server/failover-clustering /</a:t>
             </a:r>
             <a:endParaRPr b="0" lang="en-US" sz="1450" strike="noStrike" u="none">
               <a:solidFill>
@@ -20033,14 +20110,14 @@
       </p:sp>
       <p:sp>
         <p:nvSpPr>
-          <p:cNvPr id="501" name=""/>
+          <p:cNvPr id="502" name=""/>
           <p:cNvSpPr/>
           <p:nvPr/>
         </p:nvSpPr>
         <p:spPr>
           <a:xfrm>
-            <a:off x="2776680" y="2133360"/>
-            <a:ext cx="3019320" cy="10080"/>
+            <a:off x="1047600" y="2638080"/>
+            <a:ext cx="9154440" cy="10080"/>
           </a:xfrm>
           <a:custGeom>
             <a:avLst/>
@@ -20048,21 +20125,111 @@
             <a:ahLst/>
             <a:rect l="0" t="0" r="r" b="b"/>
             <a:pathLst>
-              <a:path w="8387" h="28">
+              <a:path w="25429" h="28">
                 <a:moveTo>
+                  <a:pt x="22923" y="28"/>
+                </a:moveTo>
+                <a:lnTo>
+                  <a:pt x="21967" y="28"/>
+                </a:lnTo>
+                <a:lnTo>
+                  <a:pt x="21967" y="0"/>
+                </a:lnTo>
+                <a:lnTo>
+                  <a:pt x="22923" y="0"/>
+                </a:lnTo>
+                <a:lnTo>
+                  <a:pt x="22923" y="28"/>
+                </a:lnTo>
+                <a:moveTo>
+                  <a:pt x="23069" y="0"/>
+                </a:moveTo>
+                <a:lnTo>
+                  <a:pt x="25429" y="0"/>
+                </a:lnTo>
+                <a:lnTo>
+                  <a:pt x="25429" y="28"/>
+                </a:lnTo>
+                <a:lnTo>
+                  <a:pt x="23069" y="28"/>
+                </a:lnTo>
+                <a:lnTo>
+                  <a:pt x="23069" y="0"/>
+                </a:lnTo>
+                <a:moveTo>
+                  <a:pt x="21655" y="28"/>
+                </a:moveTo>
+                <a:lnTo>
+                  <a:pt x="19932" y="28"/>
+                </a:lnTo>
+                <a:lnTo>
+                  <a:pt x="19932" y="0"/>
+                </a:lnTo>
+                <a:lnTo>
+                  <a:pt x="21655" y="0"/>
+                </a:lnTo>
+                <a:lnTo>
+                  <a:pt x="21655" y="28"/>
+                </a:lnTo>
+                <a:moveTo>
+                  <a:pt x="19773" y="28"/>
+                </a:moveTo>
+                <a:lnTo>
+                  <a:pt x="19028" y="28"/>
+                </a:lnTo>
+                <a:lnTo>
+                  <a:pt x="19028" y="0"/>
+                </a:lnTo>
+                <a:lnTo>
+                  <a:pt x="19773" y="0"/>
+                </a:lnTo>
+                <a:lnTo>
+                  <a:pt x="19773" y="28"/>
+                </a:lnTo>
+                <a:moveTo>
+                  <a:pt x="18882" y="28"/>
+                </a:moveTo>
+                <a:lnTo>
+                  <a:pt x="17886" y="28"/>
+                </a:lnTo>
+                <a:lnTo>
+                  <a:pt x="17886" y="0"/>
+                </a:lnTo>
+                <a:lnTo>
+                  <a:pt x="18882" y="0"/>
+                </a:lnTo>
+                <a:lnTo>
+                  <a:pt x="18882" y="28"/>
+                </a:lnTo>
+                <a:moveTo>
+                  <a:pt x="17574" y="28"/>
+                </a:moveTo>
+                <a:lnTo>
+                  <a:pt x="942" y="28"/>
+                </a:lnTo>
+                <a:lnTo>
+                  <a:pt x="942" y="0"/>
+                </a:lnTo>
+                <a:lnTo>
+                  <a:pt x="17574" y="0"/>
+                </a:lnTo>
+                <a:lnTo>
+                  <a:pt x="17574" y="28"/>
+                </a:lnTo>
+                <a:moveTo>
+                  <a:pt x="795" y="28"/>
+                </a:moveTo>
+                <a:lnTo>
+                  <a:pt x="0" y="28"/>
+                </a:lnTo>
+                <a:lnTo>
                   <a:pt x="0" y="0"/>
-                </a:moveTo>
-                <a:lnTo>
-                  <a:pt x="8387" y="0"/>
-                </a:lnTo>
-                <a:lnTo>
-                  <a:pt x="8387" y="28"/>
-                </a:lnTo>
-                <a:lnTo>
-                  <a:pt x="0" y="28"/>
-                </a:lnTo>
-                <a:lnTo>
-                  <a:pt x="0" y="0"/>
+                </a:lnTo>
+                <a:lnTo>
+                  <a:pt x="795" y="0"/>
+                </a:lnTo>
+                <a:lnTo>
+                  <a:pt x="795" y="28"/>
                 </a:lnTo>
                 <a:close/>
               </a:path>
@@ -20093,14 +20260,73 @@
       </p:sp>
       <p:sp>
         <p:nvSpPr>
-          <p:cNvPr id="502" name=""/>
+          <p:cNvPr id="503" name=""/>
+          <p:cNvSpPr txBox="1"/>
+          <p:nvPr/>
+        </p:nvSpPr>
+        <p:spPr>
+          <a:xfrm>
+            <a:off x="1047600" y="2176200"/>
+            <a:ext cx="4536360" cy="276120"/>
+          </a:xfrm>
+          <a:prstGeom prst="rect">
+            <a:avLst/>
+          </a:prstGeom>
+          <a:noFill/>
+          <a:ln w="0">
+            <a:noFill/>
+          </a:ln>
+        </p:spPr>
+        <p:txBody>
+          <a:bodyPr wrap="none" lIns="0" rIns="0" tIns="0" bIns="0" anchor="t">
+            <a:spAutoFit/>
+          </a:bodyPr>
+          <a:p>
+            <a:r>
+              <a:rPr b="1" lang="en-US" sz="1450" strike="noStrike" u="none">
+                <a:solidFill>
+                  <a:srgbClr val="455a64"/>
+                </a:solidFill>
+                <a:effectLst/>
+                <a:uFillTx/>
+                <a:latin typeface="Meiryo"/>
+                <a:ea typeface="Meiryo"/>
+              </a:rPr>
+              <a:t>Microsoft Learn: </a:t>
+            </a:r>
+            <a:r>
+              <a:rPr b="1" lang="ja-JP" sz="1450" strike="noStrike" u="none">
+                <a:solidFill>
+                  <a:srgbClr val="455a64"/>
+                </a:solidFill>
+                <a:effectLst/>
+                <a:uFillTx/>
+                <a:latin typeface="Meiryo"/>
+                <a:ea typeface="Meiryo"/>
+              </a:rPr>
+              <a:t>ワークグループ クラスターの作成</a:t>
+            </a:r>
+            <a:endParaRPr b="0" lang="en-US" sz="1450" strike="noStrike" u="none">
+              <a:solidFill>
+                <a:srgbClr val="000000"/>
+              </a:solidFill>
+              <a:effectLst/>
+              <a:uFillTx/>
+              <a:latin typeface="Times New Roman"/>
+            </a:endParaRPr>
+          </a:p>
+        </p:txBody>
+      </p:sp>
+      <p:sp>
+        <p:nvSpPr>
+          <p:cNvPr id="504" name=""/>
           <p:cNvSpPr/>
           <p:nvPr/>
         </p:nvSpPr>
         <p:spPr>
           <a:xfrm>
-            <a:off x="847440" y="2323800"/>
-            <a:ext cx="66960" cy="67320"/>
+            <a:off x="847440" y="2828880"/>
+            <a:ext cx="66960" cy="66960"/>
           </a:xfrm>
           <a:custGeom>
             <a:avLst/>
@@ -20108,84 +20334,84 @@
             <a:ahLst/>
             <a:rect l="0" t="0" r="r" b="b"/>
             <a:pathLst>
-              <a:path w="186" h="187">
+              <a:path w="186" h="186">
                 <a:moveTo>
                   <a:pt x="186" y="93"/>
                 </a:moveTo>
                 <a:cubicBezTo>
-                  <a:pt x="186" y="105"/>
-                  <a:pt x="184" y="118"/>
+                  <a:pt x="186" y="106"/>
+                  <a:pt x="184" y="117"/>
                   <a:pt x="179" y="129"/>
                 </a:cubicBezTo>
                 <a:cubicBezTo>
-                  <a:pt x="175" y="141"/>
-                  <a:pt x="168" y="151"/>
+                  <a:pt x="175" y="140"/>
+                  <a:pt x="168" y="150"/>
                   <a:pt x="159" y="159"/>
                 </a:cubicBezTo>
                 <a:cubicBezTo>
-                  <a:pt x="151" y="168"/>
-                  <a:pt x="140" y="175"/>
+                  <a:pt x="151" y="167"/>
+                  <a:pt x="140" y="174"/>
                   <a:pt x="128" y="179"/>
                 </a:cubicBezTo>
                 <a:cubicBezTo>
-                  <a:pt x="117" y="184"/>
-                  <a:pt x="105" y="187"/>
-                  <a:pt x="93" y="187"/>
-                </a:cubicBezTo>
-                <a:cubicBezTo>
-                  <a:pt x="81" y="187"/>
-                  <a:pt x="69" y="184"/>
+                  <a:pt x="117" y="183"/>
+                  <a:pt x="105" y="186"/>
+                  <a:pt x="93" y="186"/>
+                </a:cubicBezTo>
+                <a:cubicBezTo>
+                  <a:pt x="81" y="186"/>
+                  <a:pt x="69" y="183"/>
                   <a:pt x="57" y="179"/>
                 </a:cubicBezTo>
                 <a:cubicBezTo>
-                  <a:pt x="46" y="175"/>
-                  <a:pt x="36" y="168"/>
+                  <a:pt x="46" y="174"/>
+                  <a:pt x="36" y="167"/>
                   <a:pt x="27" y="159"/>
                 </a:cubicBezTo>
                 <a:cubicBezTo>
-                  <a:pt x="19" y="151"/>
-                  <a:pt x="12" y="141"/>
+                  <a:pt x="19" y="150"/>
+                  <a:pt x="12" y="140"/>
                   <a:pt x="7" y="129"/>
                 </a:cubicBezTo>
                 <a:cubicBezTo>
-                  <a:pt x="3" y="118"/>
-                  <a:pt x="0" y="105"/>
+                  <a:pt x="3" y="117"/>
+                  <a:pt x="0" y="106"/>
                   <a:pt x="0" y="93"/>
                 </a:cubicBezTo>
                 <a:cubicBezTo>
                   <a:pt x="0" y="81"/>
                   <a:pt x="3" y="69"/>
-                  <a:pt x="7" y="57"/>
+                  <a:pt x="7" y="58"/>
                 </a:cubicBezTo>
                 <a:cubicBezTo>
                   <a:pt x="12" y="46"/>
                   <a:pt x="19" y="36"/>
-                  <a:pt x="27" y="27"/>
+                  <a:pt x="27" y="28"/>
                 </a:cubicBezTo>
                 <a:cubicBezTo>
                   <a:pt x="36" y="19"/>
                   <a:pt x="46" y="12"/>
-                  <a:pt x="57" y="7"/>
-                </a:cubicBezTo>
-                <a:cubicBezTo>
-                  <a:pt x="69" y="3"/>
+                  <a:pt x="57" y="8"/>
+                </a:cubicBezTo>
+                <a:cubicBezTo>
+                  <a:pt x="69" y="2"/>
                   <a:pt x="81" y="0"/>
                   <a:pt x="93" y="0"/>
                 </a:cubicBezTo>
                 <a:cubicBezTo>
                   <a:pt x="105" y="0"/>
-                  <a:pt x="117" y="3"/>
-                  <a:pt x="128" y="7"/>
+                  <a:pt x="117" y="2"/>
+                  <a:pt x="128" y="8"/>
                 </a:cubicBezTo>
                 <a:cubicBezTo>
                   <a:pt x="140" y="12"/>
                   <a:pt x="151" y="19"/>
-                  <a:pt x="159" y="27"/>
+                  <a:pt x="159" y="28"/>
                 </a:cubicBezTo>
                 <a:cubicBezTo>
                   <a:pt x="168" y="36"/>
                   <a:pt x="175" y="46"/>
-                  <a:pt x="179" y="57"/>
+                  <a:pt x="179" y="58"/>
                 </a:cubicBezTo>
                 <a:cubicBezTo>
                   <a:pt x="184" y="69"/>
@@ -20221,14 +20447,14 @@
       </p:sp>
       <p:sp>
         <p:nvSpPr>
-          <p:cNvPr id="503" name=""/>
+          <p:cNvPr id="505" name=""/>
           <p:cNvSpPr txBox="1"/>
           <p:nvPr/>
         </p:nvSpPr>
         <p:spPr>
           <a:xfrm>
-            <a:off x="1047600" y="1928520"/>
-            <a:ext cx="4407480" cy="276120"/>
+            <a:off x="1047600" y="2433600"/>
+            <a:ext cx="8224200" cy="276120"/>
           </a:xfrm>
           <a:prstGeom prst="rect">
             <a:avLst/>
@@ -20246,18 +20472,6 @@
             <a:r>
               <a:rPr b="0" lang="en-US" sz="1450" strike="noStrike" u="none">
                 <a:solidFill>
-                  <a:srgbClr val="455a64"/>
-                </a:solidFill>
-                <a:effectLst/>
-                <a:uFillTx/>
-                <a:latin typeface="Meiryo"/>
-                <a:ea typeface="Meiryo"/>
-              </a:rPr>
-              <a:t>Microsoft Learn: </a:t>
-            </a:r>
-            <a:r>
-              <a:rPr b="0" lang="ja-JP" sz="1450" strike="noStrike" u="none">
-                <a:solidFill>
                   <a:srgbClr val="0288d1"/>
                 </a:solidFill>
                 <a:effectLst/>
@@ -20265,7 +20479,7 @@
                 <a:latin typeface="Meiryo"/>
                 <a:ea typeface="Meiryo"/>
               </a:rPr>
-              <a:t>ワークグループ クラスターの作成</a:t>
+              <a:t>https://learn.microsoft.com /windows-server/failover-clustering /deploy-workgroup-cluster</a:t>
             </a:r>
             <a:endParaRPr b="0" lang="en-US" sz="1450" strike="noStrike" u="none">
               <a:solidFill>
@@ -20280,14 +20494,14 @@
       </p:sp>
       <p:sp>
         <p:nvSpPr>
-          <p:cNvPr id="504" name=""/>
+          <p:cNvPr id="506" name=""/>
           <p:cNvSpPr/>
           <p:nvPr/>
         </p:nvSpPr>
         <p:spPr>
           <a:xfrm>
-            <a:off x="2881440" y="2438280"/>
-            <a:ext cx="4664880" cy="9720"/>
+            <a:off x="1047600" y="3190680"/>
+            <a:ext cx="9904680" cy="9720"/>
           </a:xfrm>
           <a:custGeom>
             <a:avLst/>
@@ -20295,21 +20509,141 @@
             <a:ahLst/>
             <a:rect l="0" t="0" r="r" b="b"/>
             <a:pathLst>
-              <a:path w="12958" h="27">
+              <a:path w="27513" h="27">
                 <a:moveTo>
+                  <a:pt x="25265" y="27"/>
+                </a:moveTo>
+                <a:lnTo>
+                  <a:pt x="22687" y="27"/>
+                </a:lnTo>
+                <a:lnTo>
+                  <a:pt x="22687" y="0"/>
+                </a:lnTo>
+                <a:lnTo>
+                  <a:pt x="25265" y="0"/>
+                </a:lnTo>
+                <a:lnTo>
+                  <a:pt x="25265" y="27"/>
+                </a:lnTo>
+                <a:moveTo>
+                  <a:pt x="25577" y="0"/>
+                </a:moveTo>
+                <a:lnTo>
+                  <a:pt x="27513" y="0"/>
+                </a:lnTo>
+                <a:lnTo>
+                  <a:pt x="27513" y="27"/>
+                </a:lnTo>
+                <a:lnTo>
+                  <a:pt x="25577" y="27"/>
+                </a:lnTo>
+                <a:lnTo>
+                  <a:pt x="25577" y="0"/>
+                </a:lnTo>
+                <a:moveTo>
+                  <a:pt x="22375" y="27"/>
+                </a:moveTo>
+                <a:lnTo>
+                  <a:pt x="19230" y="27"/>
+                </a:lnTo>
+                <a:lnTo>
+                  <a:pt x="19230" y="0"/>
+                </a:lnTo>
+                <a:lnTo>
+                  <a:pt x="22375" y="0"/>
+                </a:lnTo>
+                <a:lnTo>
+                  <a:pt x="22375" y="27"/>
+                </a:lnTo>
+                <a:moveTo>
+                  <a:pt x="19084" y="27"/>
+                </a:moveTo>
+                <a:lnTo>
+                  <a:pt x="18969" y="27"/>
+                </a:lnTo>
+                <a:lnTo>
+                  <a:pt x="18969" y="0"/>
+                </a:lnTo>
+                <a:lnTo>
+                  <a:pt x="19084" y="0"/>
+                </a:lnTo>
+                <a:lnTo>
+                  <a:pt x="19084" y="27"/>
+                </a:lnTo>
+                <a:moveTo>
+                  <a:pt x="18810" y="27"/>
+                </a:moveTo>
+                <a:lnTo>
+                  <a:pt x="9262" y="27"/>
+                </a:lnTo>
+                <a:lnTo>
+                  <a:pt x="9262" y="0"/>
+                </a:lnTo>
+                <a:lnTo>
+                  <a:pt x="18810" y="0"/>
+                </a:lnTo>
+                <a:lnTo>
+                  <a:pt x="18810" y="27"/>
+                </a:lnTo>
+                <a:moveTo>
+                  <a:pt x="9116" y="27"/>
+                </a:moveTo>
+                <a:lnTo>
+                  <a:pt x="9100" y="27"/>
+                </a:lnTo>
+                <a:lnTo>
+                  <a:pt x="9100" y="0"/>
+                </a:lnTo>
+                <a:lnTo>
+                  <a:pt x="9116" y="0"/>
+                </a:lnTo>
+                <a:lnTo>
+                  <a:pt x="9116" y="27"/>
+                </a:lnTo>
+                <a:moveTo>
+                  <a:pt x="8939" y="27"/>
+                </a:moveTo>
+                <a:lnTo>
+                  <a:pt x="8311" y="27"/>
+                </a:lnTo>
+                <a:lnTo>
+                  <a:pt x="8311" y="0"/>
+                </a:lnTo>
+                <a:lnTo>
+                  <a:pt x="8939" y="0"/>
+                </a:lnTo>
+                <a:lnTo>
+                  <a:pt x="8939" y="27"/>
+                </a:lnTo>
+                <a:moveTo>
+                  <a:pt x="8149" y="27"/>
+                </a:moveTo>
+                <a:lnTo>
+                  <a:pt x="942" y="27"/>
+                </a:lnTo>
+                <a:lnTo>
+                  <a:pt x="942" y="0"/>
+                </a:lnTo>
+                <a:lnTo>
+                  <a:pt x="8149" y="0"/>
+                </a:lnTo>
+                <a:lnTo>
+                  <a:pt x="8149" y="27"/>
+                </a:lnTo>
+                <a:moveTo>
+                  <a:pt x="795" y="27"/>
+                </a:moveTo>
+                <a:lnTo>
+                  <a:pt x="0" y="27"/>
+                </a:lnTo>
+                <a:lnTo>
                   <a:pt x="0" y="0"/>
-                </a:moveTo>
-                <a:lnTo>
-                  <a:pt x="12958" y="0"/>
-                </a:lnTo>
-                <a:lnTo>
-                  <a:pt x="12958" y="27"/>
-                </a:lnTo>
-                <a:lnTo>
-                  <a:pt x="0" y="27"/>
-                </a:lnTo>
-                <a:lnTo>
-                  <a:pt x="0" y="0"/>
+                </a:lnTo>
+                <a:lnTo>
+                  <a:pt x="795" y="0"/>
+                </a:lnTo>
+                <a:lnTo>
+                  <a:pt x="795" y="27"/>
                 </a:lnTo>
                 <a:close/>
               </a:path>
@@ -20340,14 +20674,14 @@
       </p:sp>
       <p:sp>
         <p:nvSpPr>
-          <p:cNvPr id="505" name=""/>
+          <p:cNvPr id="507" name=""/>
           <p:cNvSpPr txBox="1"/>
           <p:nvPr/>
         </p:nvSpPr>
         <p:spPr>
           <a:xfrm>
-            <a:off x="1047600" y="2233440"/>
-            <a:ext cx="6235920" cy="276120"/>
+            <a:off x="1047600" y="2738160"/>
+            <a:ext cx="7547760" cy="276120"/>
           </a:xfrm>
           <a:prstGeom prst="rect">
             <a:avLst/>
@@ -20363,44 +20697,219 @@
           </a:bodyPr>
           <a:p>
             <a:r>
+              <a:rPr b="1" lang="en-US" sz="1450" strike="noStrike" u="none">
+                <a:solidFill>
+                  <a:srgbClr val="455a64"/>
+                </a:solidFill>
+                <a:effectLst/>
+                <a:uFillTx/>
+                <a:latin typeface="Meiryo"/>
+                <a:ea typeface="Meiryo"/>
+              </a:rPr>
+              <a:t>Microsoft Learn: </a:t>
+            </a:r>
+            <a:r>
+              <a:rPr b="1" lang="ja-JP" sz="1450" strike="noStrike" u="none">
+                <a:solidFill>
+                  <a:srgbClr val="455a64"/>
+                </a:solidFill>
+                <a:effectLst/>
+                <a:uFillTx/>
+                <a:latin typeface="Meiryo"/>
+                <a:ea typeface="Meiryo"/>
+              </a:rPr>
+              <a:t>ワークグループ クラスターを使⽤してライブ マイグレーションを⾏う</a:t>
+            </a:r>
+            <a:endParaRPr b="0" lang="en-US" sz="1450" strike="noStrike" u="none">
+              <a:solidFill>
+                <a:srgbClr val="000000"/>
+              </a:solidFill>
+              <a:effectLst/>
+              <a:uFillTx/>
+              <a:latin typeface="Times New Roman"/>
+            </a:endParaRPr>
+          </a:p>
+        </p:txBody>
+      </p:sp>
+      <p:sp>
+        <p:nvSpPr>
+          <p:cNvPr id="508" name=""/>
+          <p:cNvSpPr/>
+          <p:nvPr/>
+        </p:nvSpPr>
+        <p:spPr>
+          <a:xfrm>
+            <a:off x="1047600" y="3438360"/>
+            <a:ext cx="3628440" cy="9720"/>
+          </a:xfrm>
+          <a:custGeom>
+            <a:avLst/>
+            <a:gdLst/>
+            <a:ahLst/>
+            <a:rect l="0" t="0" r="r" b="b"/>
+            <a:pathLst>
+              <a:path w="10079" h="27">
+                <a:moveTo>
+                  <a:pt x="7062" y="27"/>
+                </a:moveTo>
+                <a:lnTo>
+                  <a:pt x="2771" y="27"/>
+                </a:lnTo>
+                <a:lnTo>
+                  <a:pt x="2771" y="0"/>
+                </a:lnTo>
+                <a:lnTo>
+                  <a:pt x="7062" y="0"/>
+                </a:lnTo>
+                <a:lnTo>
+                  <a:pt x="7062" y="27"/>
+                </a:lnTo>
+                <a:moveTo>
+                  <a:pt x="7208" y="0"/>
+                </a:moveTo>
+                <a:lnTo>
+                  <a:pt x="10079" y="0"/>
+                </a:lnTo>
+                <a:lnTo>
+                  <a:pt x="10079" y="27"/>
+                </a:lnTo>
+                <a:lnTo>
+                  <a:pt x="7208" y="27"/>
+                </a:lnTo>
+                <a:lnTo>
+                  <a:pt x="7208" y="0"/>
+                </a:lnTo>
+                <a:moveTo>
+                  <a:pt x="2625" y="27"/>
+                </a:moveTo>
+                <a:lnTo>
+                  <a:pt x="1667" y="27"/>
+                </a:lnTo>
+                <a:lnTo>
+                  <a:pt x="1667" y="0"/>
+                </a:lnTo>
+                <a:lnTo>
+                  <a:pt x="2625" y="0"/>
+                </a:lnTo>
+                <a:lnTo>
+                  <a:pt x="2625" y="27"/>
+                </a:lnTo>
+                <a:moveTo>
+                  <a:pt x="1356" y="27"/>
+                </a:moveTo>
+                <a:lnTo>
+                  <a:pt x="0" y="27"/>
+                </a:lnTo>
+                <a:lnTo>
+                  <a:pt x="0" y="0"/>
+                </a:lnTo>
+                <a:lnTo>
+                  <a:pt x="1356" y="0"/>
+                </a:lnTo>
+                <a:lnTo>
+                  <a:pt x="1356" y="27"/>
+                </a:lnTo>
+                <a:close/>
+              </a:path>
+            </a:pathLst>
+          </a:custGeom>
+          <a:solidFill>
+            <a:srgbClr val="0288d1"/>
+          </a:solidFill>
+          <a:ln w="0">
+            <a:noFill/>
+          </a:ln>
+        </p:spPr>
+        <p:txBody>
+          <a:bodyPr lIns="0" rIns="0" tIns="0" bIns="0" anchor="t">
+            <a:noAutofit/>
+          </a:bodyPr>
+          <a:p>
+            <a:endParaRPr b="0" lang="en-US" sz="2400" strike="noStrike" u="none">
+              <a:solidFill>
+                <a:srgbClr val="ffffff"/>
+              </a:solidFill>
+              <a:effectLst/>
+              <a:uFillTx/>
+              <a:latin typeface="Times New Roman"/>
+            </a:endParaRPr>
+          </a:p>
+        </p:txBody>
+      </p:sp>
+      <p:sp>
+        <p:nvSpPr>
+          <p:cNvPr id="509" name=""/>
+          <p:cNvSpPr txBox="1"/>
+          <p:nvPr/>
+        </p:nvSpPr>
+        <p:spPr>
+          <a:xfrm>
+            <a:off x="1047600" y="2985840"/>
+            <a:ext cx="8991000" cy="276120"/>
+          </a:xfrm>
+          <a:prstGeom prst="rect">
+            <a:avLst/>
+          </a:prstGeom>
+          <a:noFill/>
+          <a:ln w="0">
+            <a:noFill/>
+          </a:ln>
+        </p:spPr>
+        <p:txBody>
+          <a:bodyPr wrap="none" lIns="0" rIns="0" tIns="0" bIns="0" anchor="t">
+            <a:spAutoFit/>
+          </a:bodyPr>
+          <a:p>
+            <a:r>
               <a:rPr b="0" lang="en-US" sz="1450" strike="noStrike" u="none">
                 <a:solidFill>
-                  <a:srgbClr val="455a64"/>
-                </a:solidFill>
-                <a:effectLst/>
-                <a:uFillTx/>
-                <a:latin typeface="Meiryo"/>
-                <a:ea typeface="Meiryo"/>
-              </a:rPr>
-              <a:t>MS</a:t>
-            </a:r>
-            <a:r>
-              <a:rPr b="0" lang="ja-JP" sz="1450" strike="noStrike" u="none">
-                <a:solidFill>
-                  <a:srgbClr val="455a64"/>
-                </a:solidFill>
-                <a:effectLst/>
-                <a:uFillTx/>
-                <a:latin typeface="Meiryo"/>
-                <a:ea typeface="Meiryo"/>
-              </a:rPr>
-              <a:t>サポートブログ</a:t>
-            </a:r>
+                  <a:srgbClr val="0288d1"/>
+                </a:solidFill>
+                <a:effectLst/>
+                <a:uFillTx/>
+                <a:latin typeface="Meiryo"/>
+                <a:ea typeface="Meiryo"/>
+              </a:rPr>
+              <a:t>https://learn.microsoft.com /ja-jp /windows-server/virtualization /hyper-v/manage /live-migration-</a:t>
+            </a:r>
+            <a:endParaRPr b="0" lang="en-US" sz="1450" strike="noStrike" u="none">
+              <a:solidFill>
+                <a:srgbClr val="000000"/>
+              </a:solidFill>
+              <a:effectLst/>
+              <a:uFillTx/>
+              <a:latin typeface="Times New Roman"/>
+            </a:endParaRPr>
+          </a:p>
+        </p:txBody>
+      </p:sp>
+      <p:sp>
+        <p:nvSpPr>
+          <p:cNvPr id="510" name=""/>
+          <p:cNvSpPr txBox="1"/>
+          <p:nvPr/>
+        </p:nvSpPr>
+        <p:spPr>
+          <a:xfrm>
+            <a:off x="1047600" y="3233520"/>
+            <a:ext cx="3235680" cy="276120"/>
+          </a:xfrm>
+          <a:prstGeom prst="rect">
+            <a:avLst/>
+          </a:prstGeom>
+          <a:noFill/>
+          <a:ln w="0">
+            <a:noFill/>
+          </a:ln>
+        </p:spPr>
+        <p:txBody>
+          <a:bodyPr wrap="none" lIns="0" rIns="0" tIns="0" bIns="0" anchor="t">
+            <a:spAutoFit/>
+          </a:bodyPr>
+          <a:p>
             <a:r>
               <a:rPr b="0" lang="en-US" sz="1450" strike="noStrike" u="none">
                 <a:solidFill>
-                  <a:srgbClr val="455a64"/>
-                </a:solidFill>
-                <a:effectLst/>
-                <a:uFillTx/>
-                <a:latin typeface="Meiryo"/>
-                <a:ea typeface="Meiryo"/>
-              </a:rPr>
-              <a:t>: </a:t>
-            </a:r>
-            <a:r>
-              <a:rPr b="0" lang="ja-JP" sz="1450" strike="noStrike" u="none">
-                <a:solidFill>
                   <a:srgbClr val="0288d1"/>
                 </a:solidFill>
                 <a:effectLst/>
@@ -20408,7 +20917,7 @@
                 <a:latin typeface="Meiryo"/>
                 <a:ea typeface="Meiryo"/>
               </a:rPr>
-              <a:t>ワークグループ クラスターのサポート ポリシー変更</a:t>
+              <a:t>workgroup-cluster?tabs=powershell</a:t>
             </a:r>
             <a:endParaRPr b="0" lang="en-US" sz="1450" strike="noStrike" u="none">
               <a:solidFill>
@@ -20423,13 +20932,13 @@
       </p:sp>
       <p:sp>
         <p:nvSpPr>
-          <p:cNvPr id="506" name=""/>
+          <p:cNvPr id="511" name=""/>
           <p:cNvSpPr/>
           <p:nvPr/>
         </p:nvSpPr>
         <p:spPr>
           <a:xfrm>
-            <a:off x="847440" y="3305160"/>
+            <a:off x="847440" y="4305240"/>
             <a:ext cx="66960" cy="66960"/>
           </a:xfrm>
           <a:custGeom>
@@ -20443,7 +20952,7 @@
                   <a:pt x="186" y="92"/>
                 </a:moveTo>
                 <a:cubicBezTo>
-                  <a:pt x="186" y="104"/>
+                  <a:pt x="186" y="105"/>
                   <a:pt x="184" y="116"/>
                   <a:pt x="179" y="128"/>
                 </a:cubicBezTo>
@@ -20458,13 +20967,13 @@
                   <a:pt x="128" y="179"/>
                 </a:cubicBezTo>
                 <a:cubicBezTo>
-                  <a:pt x="117" y="183"/>
+                  <a:pt x="117" y="184"/>
                   <a:pt x="105" y="186"/>
                   <a:pt x="93" y="186"/>
                 </a:cubicBezTo>
                 <a:cubicBezTo>
                   <a:pt x="81" y="186"/>
-                  <a:pt x="69" y="183"/>
+                  <a:pt x="69" y="184"/>
                   <a:pt x="57" y="179"/>
                 </a:cubicBezTo>
                 <a:cubicBezTo>
@@ -20479,7 +20988,7 @@
                 </a:cubicBezTo>
                 <a:cubicBezTo>
                   <a:pt x="3" y="116"/>
-                  <a:pt x="0" y="104"/>
+                  <a:pt x="0" y="105"/>
                   <a:pt x="0" y="92"/>
                 </a:cubicBezTo>
                 <a:cubicBezTo>
@@ -20551,13 +21060,13 @@
       </p:sp>
       <p:sp>
         <p:nvSpPr>
-          <p:cNvPr id="507" name=""/>
+          <p:cNvPr id="512" name=""/>
           <p:cNvSpPr txBox="1"/>
           <p:nvPr/>
         </p:nvSpPr>
         <p:spPr>
           <a:xfrm>
-            <a:off x="666720" y="2679840"/>
+            <a:off x="666720" y="3679920"/>
             <a:ext cx="1151280" cy="344880"/>
           </a:xfrm>
           <a:prstGeom prst="rect">
@@ -20598,14 +21107,14 @@
       </p:sp>
       <p:sp>
         <p:nvSpPr>
-          <p:cNvPr id="508" name=""/>
+          <p:cNvPr id="513" name=""/>
           <p:cNvSpPr/>
           <p:nvPr/>
         </p:nvSpPr>
         <p:spPr>
           <a:xfrm>
-            <a:off x="1998720" y="3419280"/>
-            <a:ext cx="5229720" cy="9720"/>
+            <a:off x="1047600" y="4667040"/>
+            <a:ext cx="2903400" cy="10080"/>
           </a:xfrm>
           <a:custGeom>
             <a:avLst/>
@@ -20613,21 +21122,81 @@
             <a:ahLst/>
             <a:rect l="0" t="0" r="r" b="b"/>
             <a:pathLst>
-              <a:path w="14527" h="27">
+              <a:path w="8065" h="28">
                 <a:moveTo>
+                  <a:pt x="7413" y="28"/>
+                </a:moveTo>
+                <a:lnTo>
+                  <a:pt x="7397" y="28"/>
+                </a:lnTo>
+                <a:lnTo>
+                  <a:pt x="7397" y="0"/>
+                </a:lnTo>
+                <a:lnTo>
+                  <a:pt x="7413" y="0"/>
+                </a:lnTo>
+                <a:lnTo>
+                  <a:pt x="7413" y="28"/>
+                </a:lnTo>
+                <a:moveTo>
+                  <a:pt x="7560" y="0"/>
+                </a:moveTo>
+                <a:lnTo>
+                  <a:pt x="8065" y="0"/>
+                </a:lnTo>
+                <a:lnTo>
+                  <a:pt x="8065" y="28"/>
+                </a:lnTo>
+                <a:lnTo>
+                  <a:pt x="7560" y="28"/>
+                </a:lnTo>
+                <a:lnTo>
+                  <a:pt x="7560" y="0"/>
+                </a:lnTo>
+                <a:moveTo>
+                  <a:pt x="7234" y="28"/>
+                </a:moveTo>
+                <a:lnTo>
+                  <a:pt x="4600" y="28"/>
+                </a:lnTo>
+                <a:lnTo>
+                  <a:pt x="4600" y="0"/>
+                </a:lnTo>
+                <a:lnTo>
+                  <a:pt x="7234" y="0"/>
+                </a:lnTo>
+                <a:lnTo>
+                  <a:pt x="7234" y="28"/>
+                </a:lnTo>
+                <a:moveTo>
+                  <a:pt x="4441" y="28"/>
+                </a:moveTo>
+                <a:lnTo>
+                  <a:pt x="942" y="28"/>
+                </a:lnTo>
+                <a:lnTo>
+                  <a:pt x="942" y="0"/>
+                </a:lnTo>
+                <a:lnTo>
+                  <a:pt x="4441" y="0"/>
+                </a:lnTo>
+                <a:lnTo>
+                  <a:pt x="4441" y="28"/>
+                </a:lnTo>
+                <a:moveTo>
+                  <a:pt x="795" y="28"/>
+                </a:moveTo>
+                <a:lnTo>
+                  <a:pt x="0" y="28"/>
+                </a:lnTo>
+                <a:lnTo>
                   <a:pt x="0" y="0"/>
-                </a:moveTo>
-                <a:lnTo>
-                  <a:pt x="14527" y="0"/>
-                </a:lnTo>
-                <a:lnTo>
-                  <a:pt x="14527" y="27"/>
-                </a:lnTo>
-                <a:lnTo>
-                  <a:pt x="0" y="27"/>
-                </a:lnTo>
-                <a:lnTo>
-                  <a:pt x="0" y="0"/>
+                </a:lnTo>
+                <a:lnTo>
+                  <a:pt x="795" y="0"/>
+                </a:lnTo>
+                <a:lnTo>
+                  <a:pt x="795" y="28"/>
                 </a:lnTo>
                 <a:close/>
               </a:path>
@@ -20658,13 +21227,84 @@
       </p:sp>
       <p:sp>
         <p:nvSpPr>
-          <p:cNvPr id="509" name=""/>
+          <p:cNvPr id="514" name=""/>
+          <p:cNvSpPr txBox="1"/>
+          <p:nvPr/>
+        </p:nvSpPr>
+        <p:spPr>
+          <a:xfrm>
+            <a:off x="1047600" y="4214520"/>
+            <a:ext cx="3743280" cy="276120"/>
+          </a:xfrm>
+          <a:prstGeom prst="rect">
+            <a:avLst/>
+          </a:prstGeom>
+          <a:noFill/>
+          <a:ln w="0">
+            <a:noFill/>
+          </a:ln>
+        </p:spPr>
+        <p:txBody>
+          <a:bodyPr wrap="none" lIns="0" rIns="0" tIns="0" bIns="0" anchor="t">
+            <a:spAutoFit/>
+          </a:bodyPr>
+          <a:p>
+            <a:r>
+              <a:rPr b="1" lang="ja-JP" sz="1450" strike="noStrike" u="none">
+                <a:solidFill>
+                  <a:srgbClr val="455a64"/>
+                </a:solidFill>
+                <a:effectLst/>
+                <a:uFillTx/>
+                <a:latin typeface="Meiryo"/>
+                <a:ea typeface="Meiryo"/>
+              </a:rPr>
+              <a:t>⼭市良⽒</a:t>
+            </a:r>
+            <a:r>
+              <a:rPr b="1" lang="en-US" sz="1450" strike="noStrike" u="none">
+                <a:solidFill>
+                  <a:srgbClr val="455a64"/>
+                </a:solidFill>
+                <a:effectLst/>
+                <a:uFillTx/>
+                <a:latin typeface="Meiryo"/>
+                <a:ea typeface="Meiryo"/>
+              </a:rPr>
+              <a:t>: Windows Server 2025 </a:t>
+            </a:r>
+            <a:r>
+              <a:rPr b="1" lang="ja-JP" sz="1450" strike="noStrike" u="none">
+                <a:solidFill>
+                  <a:srgbClr val="455a64"/>
+                </a:solidFill>
+                <a:effectLst/>
+                <a:uFillTx/>
+                <a:latin typeface="Meiryo"/>
+                <a:ea typeface="Meiryo"/>
+              </a:rPr>
+              <a:t>新機能</a:t>
+            </a:r>
+            <a:endParaRPr b="0" lang="en-US" sz="1450" strike="noStrike" u="none">
+              <a:solidFill>
+                <a:srgbClr val="000000"/>
+              </a:solidFill>
+              <a:effectLst/>
+              <a:uFillTx/>
+              <a:latin typeface="Times New Roman"/>
+            </a:endParaRPr>
+          </a:p>
+        </p:txBody>
+      </p:sp>
+      <p:sp>
+        <p:nvSpPr>
+          <p:cNvPr id="515" name=""/>
           <p:cNvSpPr/>
           <p:nvPr/>
         </p:nvSpPr>
         <p:spPr>
           <a:xfrm>
-            <a:off x="847440" y="3609720"/>
+            <a:off x="847440" y="4857480"/>
             <a:ext cx="66960" cy="66960"/>
           </a:xfrm>
           <a:custGeom>
@@ -20675,7 +21315,7 @@
             <a:pathLst>
               <a:path w="186" h="186">
                 <a:moveTo>
-                  <a:pt x="186" y="94"/>
+                  <a:pt x="186" y="93"/>
                 </a:moveTo>
                 <a:cubicBezTo>
                   <a:pt x="186" y="106"/>
@@ -20715,12 +21355,12 @@
                 <a:cubicBezTo>
                   <a:pt x="3" y="118"/>
                   <a:pt x="0" y="106"/>
-                  <a:pt x="0" y="94"/>
-                </a:cubicBezTo>
-                <a:cubicBezTo>
-                  <a:pt x="0" y="82"/>
-                  <a:pt x="3" y="70"/>
-                  <a:pt x="7" y="58"/>
+                  <a:pt x="0" y="93"/>
+                </a:cubicBezTo>
+                <a:cubicBezTo>
+                  <a:pt x="0" y="81"/>
+                  <a:pt x="3" y="69"/>
+                  <a:pt x="7" y="57"/>
                 </a:cubicBezTo>
                 <a:cubicBezTo>
                   <a:pt x="12" y="46"/>
@@ -20750,12 +21390,12 @@
                 <a:cubicBezTo>
                   <a:pt x="168" y="36"/>
                   <a:pt x="175" y="46"/>
-                  <a:pt x="179" y="58"/>
-                </a:cubicBezTo>
-                <a:cubicBezTo>
-                  <a:pt x="184" y="70"/>
-                  <a:pt x="186" y="82"/>
-                  <a:pt x="186" y="94"/>
+                  <a:pt x="179" y="57"/>
+                </a:cubicBezTo>
+                <a:cubicBezTo>
+                  <a:pt x="184" y="69"/>
+                  <a:pt x="186" y="81"/>
+                  <a:pt x="186" y="93"/>
                 </a:cubicBezTo>
                 <a:close/>
               </a:path>
@@ -20786,14 +21426,14 @@
       </p:sp>
       <p:sp>
         <p:nvSpPr>
-          <p:cNvPr id="510" name=""/>
+          <p:cNvPr id="516" name=""/>
           <p:cNvSpPr txBox="1"/>
           <p:nvPr/>
         </p:nvSpPr>
         <p:spPr>
           <a:xfrm>
-            <a:off x="1047600" y="3214440"/>
-            <a:ext cx="5802120" cy="276120"/>
+            <a:off x="1047600" y="4462200"/>
+            <a:ext cx="2646720" cy="276120"/>
           </a:xfrm>
           <a:prstGeom prst="rect">
             <a:avLst/>
@@ -20809,32 +21449,8 @@
           </a:bodyPr>
           <a:p>
             <a:r>
-              <a:rPr b="0" lang="ja-JP" sz="1450" strike="noStrike" u="none">
-                <a:solidFill>
-                  <a:srgbClr val="455a64"/>
-                </a:solidFill>
-                <a:effectLst/>
-                <a:uFillTx/>
-                <a:latin typeface="Meiryo"/>
-                <a:ea typeface="Meiryo"/>
-              </a:rPr>
-              <a:t>⼭市良⽒</a:t>
-            </a:r>
-            <a:r>
               <a:rPr b="0" lang="en-US" sz="1450" strike="noStrike" u="none">
                 <a:solidFill>
-                  <a:srgbClr val="455a64"/>
-                </a:solidFill>
-                <a:effectLst/>
-                <a:uFillTx/>
-                <a:latin typeface="Meiryo"/>
-                <a:ea typeface="Meiryo"/>
-              </a:rPr>
-              <a:t>: </a:t>
-            </a:r>
-            <a:r>
-              <a:rPr b="0" lang="en-US" sz="1450" strike="noStrike" u="none">
-                <a:solidFill>
                   <a:srgbClr val="0288d1"/>
                 </a:solidFill>
                 <a:effectLst/>
@@ -20842,19 +21458,7 @@
                 <a:latin typeface="Meiryo"/>
                 <a:ea typeface="Meiryo"/>
               </a:rPr>
-              <a:t>Windows Server 2025 </a:t>
-            </a:r>
-            <a:r>
-              <a:rPr b="0" lang="ja-JP" sz="1450" strike="noStrike" u="none">
-                <a:solidFill>
-                  <a:srgbClr val="0288d1"/>
-                </a:solidFill>
-                <a:effectLst/>
-                <a:uFillTx/>
-                <a:latin typeface="Meiryo"/>
-                <a:ea typeface="Meiryo"/>
-              </a:rPr>
-              <a:t>ワークグループクラスター新機能</a:t>
+              <a:t>https://www.say-tech.co.jp /</a:t>
             </a:r>
             <a:endParaRPr b="0" lang="en-US" sz="1450" strike="noStrike" u="none">
               <a:solidFill>
@@ -20869,14 +21473,14 @@
       </p:sp>
       <p:sp>
         <p:nvSpPr>
-          <p:cNvPr id="511" name=""/>
+          <p:cNvPr id="517" name=""/>
           <p:cNvSpPr/>
           <p:nvPr/>
         </p:nvSpPr>
         <p:spPr>
           <a:xfrm>
-            <a:off x="2997720" y="3724200"/>
-            <a:ext cx="3643920" cy="9720"/>
+            <a:off x="1047600" y="5219640"/>
+            <a:ext cx="3794400" cy="9720"/>
           </a:xfrm>
           <a:custGeom>
             <a:avLst/>
@@ -20884,51 +21488,66 @@
             <a:ahLst/>
             <a:rect l="0" t="0" r="r" b="b"/>
             <a:pathLst>
-              <a:path w="10122" h="27">
+              <a:path w="10540" h="27">
                 <a:moveTo>
-                  <a:pt x="728" y="27"/>
+                  <a:pt x="7578" y="27"/>
                 </a:moveTo>
                 <a:lnTo>
-                  <a:pt x="609" y="27"/>
-                </a:lnTo>
-                <a:lnTo>
-                  <a:pt x="609" y="0"/>
-                </a:lnTo>
-                <a:lnTo>
-                  <a:pt x="728" y="0"/>
-                </a:lnTo>
-                <a:lnTo>
-                  <a:pt x="728" y="27"/>
+                  <a:pt x="7562" y="27"/>
+                </a:lnTo>
+                <a:lnTo>
+                  <a:pt x="7562" y="0"/>
+                </a:lnTo>
+                <a:lnTo>
+                  <a:pt x="7578" y="0"/>
+                </a:lnTo>
+                <a:lnTo>
+                  <a:pt x="7578" y="27"/>
                 </a:lnTo>
                 <a:moveTo>
-                  <a:pt x="874" y="0"/>
+                  <a:pt x="7724" y="0"/>
                 </a:moveTo>
                 <a:lnTo>
-                  <a:pt x="10122" y="0"/>
-                </a:lnTo>
-                <a:lnTo>
-                  <a:pt x="10122" y="27"/>
-                </a:lnTo>
-                <a:lnTo>
-                  <a:pt x="874" y="27"/>
-                </a:lnTo>
-                <a:lnTo>
-                  <a:pt x="874" y="0"/>
+                  <a:pt x="10540" y="0"/>
+                </a:lnTo>
+                <a:lnTo>
+                  <a:pt x="10540" y="27"/>
+                </a:lnTo>
+                <a:lnTo>
+                  <a:pt x="7724" y="27"/>
+                </a:lnTo>
+                <a:lnTo>
+                  <a:pt x="7724" y="0"/>
                 </a:lnTo>
                 <a:moveTo>
-                  <a:pt x="450" y="27"/>
+                  <a:pt x="7398" y="27"/>
                 </a:moveTo>
                 <a:lnTo>
+                  <a:pt x="942" y="27"/>
+                </a:lnTo>
+                <a:lnTo>
+                  <a:pt x="942" y="0"/>
+                </a:lnTo>
+                <a:lnTo>
+                  <a:pt x="7398" y="0"/>
+                </a:lnTo>
+                <a:lnTo>
+                  <a:pt x="7398" y="27"/>
+                </a:lnTo>
+                <a:moveTo>
+                  <a:pt x="795" y="27"/>
+                </a:moveTo>
+                <a:lnTo>
                   <a:pt x="0" y="27"/>
                 </a:lnTo>
                 <a:lnTo>
                   <a:pt x="0" y="0"/>
                 </a:lnTo>
                 <a:lnTo>
-                  <a:pt x="450" y="0"/>
-                </a:lnTo>
-                <a:lnTo>
-                  <a:pt x="450" y="27"/>
+                  <a:pt x="795" y="0"/>
+                </a:lnTo>
+                <a:lnTo>
+                  <a:pt x="795" y="27"/>
                 </a:lnTo>
                 <a:close/>
               </a:path>
@@ -20959,13 +21578,96 @@
       </p:sp>
       <p:sp>
         <p:nvSpPr>
-          <p:cNvPr id="512" name=""/>
+          <p:cNvPr id="518" name=""/>
+          <p:cNvSpPr txBox="1"/>
+          <p:nvPr/>
+        </p:nvSpPr>
+        <p:spPr>
+          <a:xfrm>
+            <a:off x="1047600" y="4767120"/>
+            <a:ext cx="4143240" cy="276120"/>
+          </a:xfrm>
+          <a:prstGeom prst="rect">
+            <a:avLst/>
+          </a:prstGeom>
+          <a:noFill/>
+          <a:ln w="0">
+            <a:noFill/>
+          </a:ln>
+        </p:spPr>
+        <p:txBody>
+          <a:bodyPr wrap="none" lIns="0" rIns="0" tIns="0" bIns="0" anchor="t">
+            <a:spAutoFit/>
+          </a:bodyPr>
+          <a:p>
+            <a:r>
+              <a:rPr b="1" lang="en-US" sz="1450" strike="noStrike" u="none">
+                <a:solidFill>
+                  <a:srgbClr val="455a64"/>
+                </a:solidFill>
+                <a:effectLst/>
+                <a:uFillTx/>
+                <a:latin typeface="Meiryo"/>
+                <a:ea typeface="Meiryo"/>
+              </a:rPr>
+              <a:t>NTT</a:t>
+            </a:r>
+            <a:r>
+              <a:rPr b="1" lang="ja-JP" sz="1450" strike="noStrike" u="none">
+                <a:solidFill>
+                  <a:srgbClr val="455a64"/>
+                </a:solidFill>
+                <a:effectLst/>
+                <a:uFillTx/>
+                <a:latin typeface="Meiryo"/>
+                <a:ea typeface="Meiryo"/>
+              </a:rPr>
+              <a:t>データ先端技術</a:t>
+            </a:r>
+            <a:r>
+              <a:rPr b="1" lang="en-US" sz="1450" strike="noStrike" u="none">
+                <a:solidFill>
+                  <a:srgbClr val="455a64"/>
+                </a:solidFill>
+                <a:effectLst/>
+                <a:uFillTx/>
+                <a:latin typeface="Meiryo"/>
+                <a:ea typeface="Meiryo"/>
+              </a:rPr>
+              <a:t>: Hyper-V </a:t>
+            </a:r>
+            <a:r>
+              <a:rPr b="1" lang="ja-JP" sz="1450" strike="noStrike" u="none">
+                <a:solidFill>
+                  <a:srgbClr val="455a64"/>
+                </a:solidFill>
+                <a:effectLst/>
+                <a:uFillTx/>
+                <a:latin typeface="Meiryo"/>
+                <a:ea typeface="Meiryo"/>
+              </a:rPr>
+              <a:t>クラスター検証</a:t>
+            </a:r>
+            <a:endParaRPr b="0" lang="en-US" sz="1450" strike="noStrike" u="none">
+              <a:solidFill>
+                <a:srgbClr val="000000"/>
+              </a:solidFill>
+              <a:effectLst/>
+              <a:uFillTx/>
+              <a:latin typeface="Times New Roman"/>
+            </a:endParaRPr>
+          </a:p>
+        </p:txBody>
+      </p:sp>
+      <p:sp>
+        <p:nvSpPr>
+          <p:cNvPr id="519" name=""/>
           <p:cNvSpPr/>
           <p:nvPr/>
         </p:nvSpPr>
         <p:spPr>
           <a:xfrm>
-            <a:off x="847440" y="3914640"/>
+            <a:off x="847440" y="5410080"/>
             <a:ext cx="66960" cy="66960"/>
           </a:xfrm>
           <a:custGeom>
@@ -20976,12 +21678,12 @@
             <a:pathLst>
               <a:path w="186" h="186">
                 <a:moveTo>
-                  <a:pt x="186" y="92"/>
+                  <a:pt x="186" y="93"/>
                 </a:moveTo>
                 <a:cubicBezTo>
-                  <a:pt x="186" y="105"/>
-                  <a:pt x="184" y="117"/>
-                  <a:pt x="179" y="128"/>
+                  <a:pt x="186" y="106"/>
+                  <a:pt x="184" y="118"/>
+                  <a:pt x="179" y="129"/>
                 </a:cubicBezTo>
                 <a:cubicBezTo>
                   <a:pt x="175" y="140"/>
@@ -21011,17 +21713,17 @@
                 <a:cubicBezTo>
                   <a:pt x="19" y="150"/>
                   <a:pt x="12" y="140"/>
-                  <a:pt x="7" y="128"/>
-                </a:cubicBezTo>
-                <a:cubicBezTo>
-                  <a:pt x="3" y="117"/>
-                  <a:pt x="0" y="105"/>
-                  <a:pt x="0" y="92"/>
-                </a:cubicBezTo>
-                <a:cubicBezTo>
-                  <a:pt x="0" y="80"/>
-                  <a:pt x="3" y="68"/>
-                  <a:pt x="7" y="57"/>
+                  <a:pt x="7" y="129"/>
+                </a:cubicBezTo>
+                <a:cubicBezTo>
+                  <a:pt x="3" y="118"/>
+                  <a:pt x="0" y="106"/>
+                  <a:pt x="0" y="93"/>
+                </a:cubicBezTo>
+                <a:cubicBezTo>
+                  <a:pt x="0" y="81"/>
+                  <a:pt x="3" y="69"/>
+                  <a:pt x="7" y="58"/>
                 </a:cubicBezTo>
                 <a:cubicBezTo>
                   <a:pt x="12" y="46"/>
@@ -21051,12 +21753,12 @@
                 <a:cubicBezTo>
                   <a:pt x="168" y="36"/>
                   <a:pt x="175" y="46"/>
-                  <a:pt x="179" y="57"/>
-                </a:cubicBezTo>
-                <a:cubicBezTo>
-                  <a:pt x="184" y="68"/>
-                  <a:pt x="186" y="80"/>
-                  <a:pt x="186" y="92"/>
+                  <a:pt x="179" y="58"/>
+                </a:cubicBezTo>
+                <a:cubicBezTo>
+                  <a:pt x="184" y="69"/>
+                  <a:pt x="186" y="81"/>
+                  <a:pt x="186" y="93"/>
                 </a:cubicBezTo>
                 <a:close/>
               </a:path>
@@ -21087,14 +21789,14 @@
       </p:sp>
       <p:sp>
         <p:nvSpPr>
-          <p:cNvPr id="513" name=""/>
+          <p:cNvPr id="520" name=""/>
           <p:cNvSpPr txBox="1"/>
           <p:nvPr/>
         </p:nvSpPr>
         <p:spPr>
           <a:xfrm>
-            <a:off x="1047600" y="3519360"/>
-            <a:ext cx="5357160" cy="276120"/>
+            <a:off x="1047600" y="5014800"/>
+            <a:ext cx="3465720" cy="276120"/>
           </a:xfrm>
           <a:prstGeom prst="rect">
             <a:avLst/>
@@ -21112,42 +21814,6 @@
             <a:r>
               <a:rPr b="0" lang="en-US" sz="1450" strike="noStrike" u="none">
                 <a:solidFill>
-                  <a:srgbClr val="455a64"/>
-                </a:solidFill>
-                <a:effectLst/>
-                <a:uFillTx/>
-                <a:latin typeface="Meiryo"/>
-                <a:ea typeface="Meiryo"/>
-              </a:rPr>
-              <a:t>NTT</a:t>
-            </a:r>
-            <a:r>
-              <a:rPr b="0" lang="ja-JP" sz="1450" strike="noStrike" u="none">
-                <a:solidFill>
-                  <a:srgbClr val="455a64"/>
-                </a:solidFill>
-                <a:effectLst/>
-                <a:uFillTx/>
-                <a:latin typeface="Meiryo"/>
-                <a:ea typeface="Meiryo"/>
-              </a:rPr>
-              <a:t>データ先端技術</a:t>
-            </a:r>
-            <a:r>
-              <a:rPr b="0" lang="en-US" sz="1450" strike="noStrike" u="none">
-                <a:solidFill>
-                  <a:srgbClr val="455a64"/>
-                </a:solidFill>
-                <a:effectLst/>
-                <a:uFillTx/>
-                <a:latin typeface="Meiryo"/>
-                <a:ea typeface="Meiryo"/>
-              </a:rPr>
-              <a:t>: </a:t>
-            </a:r>
-            <a:r>
-              <a:rPr b="0" lang="en-US" sz="1450" strike="noStrike" u="none">
-                <a:solidFill>
                   <a:srgbClr val="0288d1"/>
                 </a:solidFill>
                 <a:effectLst/>
@@ -21155,19 +21821,7 @@
                 <a:latin typeface="Meiryo"/>
                 <a:ea typeface="Meiryo"/>
               </a:rPr>
-              <a:t>Hyper-V </a:t>
-            </a:r>
-            <a:r>
-              <a:rPr b="0" lang="ja-JP" sz="1450" strike="noStrike" u="none">
-                <a:solidFill>
-                  <a:srgbClr val="0288d1"/>
-                </a:solidFill>
-                <a:effectLst/>
-                <a:uFillTx/>
-                <a:latin typeface="Meiryo"/>
-                <a:ea typeface="Meiryo"/>
-              </a:rPr>
-              <a:t>ワークグループクラスター検証</a:t>
+              <a:t>https://www.intellilink.co.jp /column /</a:t>
             </a:r>
             <a:endParaRPr b="0" lang="en-US" sz="1450" strike="noStrike" u="none">
               <a:solidFill>
@@ -21182,14 +21836,14 @@
       </p:sp>
       <p:sp>
         <p:nvSpPr>
-          <p:cNvPr id="514" name=""/>
+          <p:cNvPr id="521" name=""/>
           <p:cNvSpPr/>
           <p:nvPr/>
         </p:nvSpPr>
         <p:spPr>
           <a:xfrm>
-            <a:off x="2365920" y="4028760"/>
-            <a:ext cx="3765600" cy="10080"/>
+            <a:off x="1047600" y="5771880"/>
+            <a:ext cx="3055320" cy="10080"/>
           </a:xfrm>
           <a:custGeom>
             <a:avLst/>
@@ -21197,51 +21851,36 @@
             <a:ahLst/>
             <a:rect l="0" t="0" r="r" b="b"/>
             <a:pathLst>
-              <a:path w="10460" h="28">
+              <a:path w="8487" h="28">
                 <a:moveTo>
-                  <a:pt x="5636" y="28"/>
+                  <a:pt x="795" y="28"/>
                 </a:moveTo>
                 <a:lnTo>
-                  <a:pt x="5518" y="28"/>
-                </a:lnTo>
-                <a:lnTo>
-                  <a:pt x="5518" y="0"/>
-                </a:lnTo>
-                <a:lnTo>
-                  <a:pt x="5636" y="0"/>
-                </a:lnTo>
-                <a:lnTo>
-                  <a:pt x="5636" y="28"/>
+                  <a:pt x="0" y="28"/>
+                </a:lnTo>
+                <a:lnTo>
+                  <a:pt x="0" y="0"/>
+                </a:lnTo>
+                <a:lnTo>
+                  <a:pt x="795" y="0"/>
+                </a:lnTo>
+                <a:lnTo>
+                  <a:pt x="795" y="28"/>
                 </a:lnTo>
                 <a:moveTo>
-                  <a:pt x="5783" y="0"/>
+                  <a:pt x="942" y="0"/>
                 </a:moveTo>
                 <a:lnTo>
-                  <a:pt x="10460" y="0"/>
-                </a:lnTo>
-                <a:lnTo>
-                  <a:pt x="10460" y="28"/>
-                </a:lnTo>
-                <a:lnTo>
-                  <a:pt x="5783" y="28"/>
-                </a:lnTo>
-                <a:lnTo>
-                  <a:pt x="5783" y="0"/>
-                </a:lnTo>
-                <a:moveTo>
-                  <a:pt x="5359" y="28"/>
-                </a:moveTo>
-                <a:lnTo>
-                  <a:pt x="0" y="28"/>
-                </a:lnTo>
-                <a:lnTo>
-                  <a:pt x="0" y="0"/>
-                </a:lnTo>
-                <a:lnTo>
-                  <a:pt x="5359" y="0"/>
-                </a:lnTo>
-                <a:lnTo>
-                  <a:pt x="5359" y="28"/>
+                  <a:pt x="8487" y="0"/>
+                </a:lnTo>
+                <a:lnTo>
+                  <a:pt x="8487" y="28"/>
+                </a:lnTo>
+                <a:lnTo>
+                  <a:pt x="942" y="28"/>
+                </a:lnTo>
+                <a:lnTo>
+                  <a:pt x="942" y="0"/>
                 </a:lnTo>
                 <a:close/>
               </a:path>
@@ -21272,14 +21911,14 @@
       </p:sp>
       <p:sp>
         <p:nvSpPr>
-          <p:cNvPr id="515" name=""/>
+          <p:cNvPr id="522" name=""/>
           <p:cNvSpPr txBox="1"/>
           <p:nvPr/>
         </p:nvSpPr>
         <p:spPr>
           <a:xfrm>
-            <a:off x="1047600" y="3823920"/>
-            <a:ext cx="4853880" cy="276120"/>
+            <a:off x="1047600" y="5319360"/>
+            <a:ext cx="3169080" cy="276120"/>
           </a:xfrm>
           <a:prstGeom prst="rect">
             <a:avLst/>
@@ -21295,20 +21934,67 @@
           </a:bodyPr>
           <a:p>
             <a:r>
+              <a:rPr b="1" lang="en-US" sz="1450" strike="noStrike" u="none">
+                <a:solidFill>
+                  <a:srgbClr val="455a64"/>
+                </a:solidFill>
+                <a:effectLst/>
+                <a:uFillTx/>
+                <a:latin typeface="Meiryo"/>
+                <a:ea typeface="Meiryo"/>
+              </a:rPr>
+              <a:t>AzureFeeds: </a:t>
+            </a:r>
+            <a:r>
+              <a:rPr b="1" lang="ja-JP" sz="1450" strike="noStrike" u="none">
+                <a:solidFill>
+                  <a:srgbClr val="455a64"/>
+                </a:solidFill>
+                <a:effectLst/>
+                <a:uFillTx/>
+                <a:latin typeface="Meiryo"/>
+                <a:ea typeface="Meiryo"/>
+              </a:rPr>
+              <a:t>証明書ベース認証構築</a:t>
+            </a:r>
+            <a:endParaRPr b="0" lang="en-US" sz="1450" strike="noStrike" u="none">
+              <a:solidFill>
+                <a:srgbClr val="000000"/>
+              </a:solidFill>
+              <a:effectLst/>
+              <a:uFillTx/>
+              <a:latin typeface="Times New Roman"/>
+            </a:endParaRPr>
+          </a:p>
+        </p:txBody>
+      </p:sp>
+      <p:sp>
+        <p:nvSpPr>
+          <p:cNvPr id="523" name=""/>
+          <p:cNvSpPr txBox="1"/>
+          <p:nvPr/>
+        </p:nvSpPr>
+        <p:spPr>
+          <a:xfrm>
+            <a:off x="1047600" y="5567040"/>
+            <a:ext cx="2793960" cy="276120"/>
+          </a:xfrm>
+          <a:prstGeom prst="rect">
+            <a:avLst/>
+          </a:prstGeom>
+          <a:noFill/>
+          <a:ln w="0">
+            <a:noFill/>
+          </a:ln>
+        </p:spPr>
+        <p:txBody>
+          <a:bodyPr wrap="none" lIns="0" rIns="0" tIns="0" bIns="0" anchor="t">
+            <a:spAutoFit/>
+          </a:bodyPr>
+          <a:p>
+            <a:r>
               <a:rPr b="0" lang="en-US" sz="1450" strike="noStrike" u="none">
                 <a:solidFill>
-                  <a:srgbClr val="455a64"/>
-                </a:solidFill>
-                <a:effectLst/>
-                <a:uFillTx/>
-                <a:latin typeface="Meiryo"/>
-                <a:ea typeface="Meiryo"/>
-              </a:rPr>
-              <a:t>AzureFeeds: </a:t>
-            </a:r>
-            <a:r>
-              <a:rPr b="0" lang="ja-JP" sz="1450" strike="noStrike" u="none">
-                <a:solidFill>
                   <a:srgbClr val="0288d1"/>
                 </a:solidFill>
                 <a:effectLst/>
@@ -21316,31 +22002,7 @@
                 <a:latin typeface="Meiryo"/>
                 <a:ea typeface="Meiryo"/>
               </a:rPr>
-              <a:t>証明書ベース認証で</a:t>
-            </a:r>
-            <a:r>
-              <a:rPr b="0" lang="en-US" sz="1450" strike="noStrike" u="none">
-                <a:solidFill>
-                  <a:srgbClr val="0288d1"/>
-                </a:solidFill>
-                <a:effectLst/>
-                <a:uFillTx/>
-                <a:latin typeface="Meiryo"/>
-                <a:ea typeface="Meiryo"/>
-              </a:rPr>
-              <a:t>Hyper-V</a:t>
-            </a:r>
-            <a:r>
-              <a:rPr b="0" lang="ja-JP" sz="1450" strike="noStrike" u="none">
-                <a:solidFill>
-                  <a:srgbClr val="0288d1"/>
-                </a:solidFill>
-                <a:effectLst/>
-                <a:uFillTx/>
-                <a:latin typeface="Meiryo"/>
-                <a:ea typeface="Meiryo"/>
-              </a:rPr>
-              <a:t>クラスタ構築</a:t>
+              <a:t>https://www.azurefeeds.com /</a:t>
             </a:r>
             <a:endParaRPr b="0" lang="en-US" sz="1450" strike="noStrike" u="none">
               <a:solidFill>
@@ -21355,7 +22017,7 @@
       </p:sp>
       <p:sp>
         <p:nvSpPr>
-          <p:cNvPr id="516" name=""/>
+          <p:cNvPr id="524" name=""/>
           <p:cNvSpPr txBox="1"/>
           <p:nvPr/>
         </p:nvSpPr>
@@ -21432,7 +22094,7 @@
       </p:grpSpPr>
       <p:sp>
         <p:nvSpPr>
-          <p:cNvPr id="517" name=""/>
+          <p:cNvPr id="525" name=""/>
           <p:cNvSpPr/>
           <p:nvPr/>
         </p:nvSpPr>
@@ -21492,7 +22154,7 @@
       </p:sp>
       <p:sp>
         <p:nvSpPr>
-          <p:cNvPr id="518" name=""/>
+          <p:cNvPr id="526" name=""/>
           <p:cNvSpPr/>
           <p:nvPr/>
         </p:nvSpPr>
@@ -21552,7 +22214,7 @@
       </p:sp>
       <p:sp>
         <p:nvSpPr>
-          <p:cNvPr id="519" name=""/>
+          <p:cNvPr id="527" name=""/>
           <p:cNvSpPr/>
           <p:nvPr/>
         </p:nvSpPr>
@@ -21612,7 +22274,7 @@
       </p:sp>
       <p:pic>
         <p:nvPicPr>
-          <p:cNvPr id="520" name="" descr=""/>
+          <p:cNvPr id="528" name="" descr=""/>
           <p:cNvPicPr/>
           <p:nvPr/>
         </p:nvPicPr>
@@ -21636,7 +22298,7 @@
       </p:pic>
       <p:sp>
         <p:nvSpPr>
-          <p:cNvPr id="521" name=""/>
+          <p:cNvPr id="529" name=""/>
           <p:cNvSpPr txBox="1"/>
           <p:nvPr/>
         </p:nvSpPr>
@@ -21683,7 +22345,7 @@
       </p:sp>
       <p:sp>
         <p:nvSpPr>
-          <p:cNvPr id="522" name=""/>
+          <p:cNvPr id="530" name=""/>
           <p:cNvSpPr txBox="1"/>
           <p:nvPr/>
         </p:nvSpPr>
@@ -21730,7 +22392,7 @@
       </p:sp>
       <p:sp>
         <p:nvSpPr>
-          <p:cNvPr id="523" name=""/>
+          <p:cNvPr id="531" name=""/>
           <p:cNvSpPr txBox="1"/>
           <p:nvPr/>
         </p:nvSpPr>
@@ -21777,7 +22439,7 @@
       </p:sp>
       <p:sp>
         <p:nvSpPr>
-          <p:cNvPr id="524" name=""/>
+          <p:cNvPr id="532" name=""/>
           <p:cNvSpPr txBox="1"/>
           <p:nvPr/>
         </p:nvSpPr>
@@ -21836,7 +22498,7 @@
       </p:sp>
       <p:sp>
         <p:nvSpPr>
-          <p:cNvPr id="525" name=""/>
+          <p:cNvPr id="533" name=""/>
           <p:cNvSpPr txBox="1"/>
           <p:nvPr/>
         </p:nvSpPr>
@@ -35701,8 +36363,8 @@
         </p:nvSpPr>
         <p:spPr>
           <a:xfrm>
-            <a:off x="676080" y="1542960"/>
-            <a:ext cx="1324440" cy="267120"/>
+            <a:off x="676080" y="2238120"/>
+            <a:ext cx="1876680" cy="381600"/>
           </a:xfrm>
           <a:custGeom>
             <a:avLst/>
@@ -35710,18 +36372,18 @@
             <a:ahLst/>
             <a:rect l="0" t="0" r="r" b="b"/>
             <a:pathLst>
-              <a:path w="3679" h="742">
+              <a:path w="5213" h="1060">
                 <a:moveTo>
                   <a:pt x="0" y="0"/>
                 </a:moveTo>
                 <a:lnTo>
-                  <a:pt x="3679" y="0"/>
-                </a:lnTo>
-                <a:lnTo>
-                  <a:pt x="3679" y="742"/>
-                </a:lnTo>
-                <a:lnTo>
-                  <a:pt x="0" y="742"/>
+                  <a:pt x="5213" y="0"/>
+                </a:lnTo>
+                <a:lnTo>
+                  <a:pt x="5213" y="1060"/>
+                </a:lnTo>
+                <a:lnTo>
+                  <a:pt x="0" y="1060"/>
                 </a:lnTo>
                 <a:lnTo>
                   <a:pt x="0" y="0"/>
@@ -35761,8 +36423,8 @@
         </p:nvSpPr>
         <p:spPr>
           <a:xfrm>
-            <a:off x="2000160" y="1542960"/>
-            <a:ext cx="1076760" cy="267120"/>
+            <a:off x="2552400" y="2238120"/>
+            <a:ext cx="1533960" cy="381600"/>
           </a:xfrm>
           <a:custGeom>
             <a:avLst/>
@@ -35770,18 +36432,18 @@
             <a:ahLst/>
             <a:rect l="0" t="0" r="r" b="b"/>
             <a:pathLst>
-              <a:path w="2991" h="742">
+              <a:path w="4261" h="1060">
                 <a:moveTo>
                   <a:pt x="0" y="0"/>
                 </a:moveTo>
                 <a:lnTo>
-                  <a:pt x="2991" y="0"/>
-                </a:lnTo>
-                <a:lnTo>
-                  <a:pt x="2991" y="742"/>
-                </a:lnTo>
-                <a:lnTo>
-                  <a:pt x="0" y="742"/>
+                  <a:pt x="4261" y="0"/>
+                </a:lnTo>
+                <a:lnTo>
+                  <a:pt x="4261" y="1060"/>
+                </a:lnTo>
+                <a:lnTo>
+                  <a:pt x="0" y="1060"/>
                 </a:lnTo>
                 <a:lnTo>
                   <a:pt x="0" y="0"/>
@@ -35821,8 +36483,8 @@
         </p:nvSpPr>
         <p:spPr>
           <a:xfrm>
-            <a:off x="3076560" y="1542960"/>
-            <a:ext cx="2819520" cy="267120"/>
+            <a:off x="4086000" y="2238120"/>
+            <a:ext cx="4010400" cy="381600"/>
           </a:xfrm>
           <a:custGeom>
             <a:avLst/>
@@ -35830,18 +36492,18 @@
             <a:ahLst/>
             <a:rect l="0" t="0" r="r" b="b"/>
             <a:pathLst>
-              <a:path w="7832" h="742">
+              <a:path w="11140" h="1060">
                 <a:moveTo>
                   <a:pt x="0" y="0"/>
                 </a:moveTo>
                 <a:lnTo>
-                  <a:pt x="7832" y="0"/>
-                </a:lnTo>
-                <a:lnTo>
-                  <a:pt x="7832" y="742"/>
-                </a:lnTo>
-                <a:lnTo>
-                  <a:pt x="0" y="742"/>
+                  <a:pt x="11140" y="0"/>
+                </a:lnTo>
+                <a:lnTo>
+                  <a:pt x="11140" y="1060"/>
+                </a:lnTo>
+                <a:lnTo>
+                  <a:pt x="0" y="1060"/>
                 </a:lnTo>
                 <a:lnTo>
                   <a:pt x="0" y="0"/>
@@ -35881,8 +36543,8 @@
         </p:nvSpPr>
         <p:spPr>
           <a:xfrm>
-            <a:off x="676080" y="1809720"/>
-            <a:ext cx="1324440" cy="266760"/>
+            <a:off x="676080" y="2619360"/>
+            <a:ext cx="1876680" cy="381240"/>
           </a:xfrm>
           <a:custGeom>
             <a:avLst/>
@@ -35890,18 +36552,18 @@
             <a:ahLst/>
             <a:rect l="0" t="0" r="r" b="b"/>
             <a:pathLst>
-              <a:path w="3679" h="741">
+              <a:path w="5213" h="1059">
                 <a:moveTo>
                   <a:pt x="0" y="0"/>
                 </a:moveTo>
                 <a:lnTo>
-                  <a:pt x="3679" y="0"/>
-                </a:lnTo>
-                <a:lnTo>
-                  <a:pt x="3679" y="741"/>
-                </a:lnTo>
-                <a:lnTo>
-                  <a:pt x="0" y="741"/>
+                  <a:pt x="5213" y="0"/>
+                </a:lnTo>
+                <a:lnTo>
+                  <a:pt x="5213" y="1059"/>
+                </a:lnTo>
+                <a:lnTo>
+                  <a:pt x="0" y="1059"/>
                 </a:lnTo>
                 <a:lnTo>
                   <a:pt x="0" y="0"/>
@@ -35943,8 +36605,8 @@
         </p:nvSpPr>
         <p:spPr>
           <a:xfrm>
-            <a:off x="2000160" y="1809720"/>
-            <a:ext cx="1076760" cy="266760"/>
+            <a:off x="2552400" y="2619360"/>
+            <a:ext cx="1533960" cy="381240"/>
           </a:xfrm>
           <a:custGeom>
             <a:avLst/>
@@ -35952,18 +36614,18 @@
             <a:ahLst/>
             <a:rect l="0" t="0" r="r" b="b"/>
             <a:pathLst>
-              <a:path w="2991" h="741">
+              <a:path w="4261" h="1059">
                 <a:moveTo>
                   <a:pt x="0" y="0"/>
                 </a:moveTo>
                 <a:lnTo>
-                  <a:pt x="2991" y="0"/>
-                </a:lnTo>
-                <a:lnTo>
-                  <a:pt x="2991" y="741"/>
-                </a:lnTo>
-                <a:lnTo>
-                  <a:pt x="0" y="741"/>
+                  <a:pt x="4261" y="0"/>
+                </a:lnTo>
+                <a:lnTo>
+                  <a:pt x="4261" y="1059"/>
+                </a:lnTo>
+                <a:lnTo>
+                  <a:pt x="0" y="1059"/>
                 </a:lnTo>
                 <a:lnTo>
                   <a:pt x="0" y="0"/>
@@ -36005,8 +36667,8 @@
         </p:nvSpPr>
         <p:spPr>
           <a:xfrm>
-            <a:off x="3076560" y="1809720"/>
-            <a:ext cx="2819520" cy="266760"/>
+            <a:off x="4086000" y="2619360"/>
+            <a:ext cx="4010400" cy="381240"/>
           </a:xfrm>
           <a:custGeom>
             <a:avLst/>
@@ -36014,18 +36676,18 @@
             <a:ahLst/>
             <a:rect l="0" t="0" r="r" b="b"/>
             <a:pathLst>
-              <a:path w="7832" h="741">
+              <a:path w="11140" h="1059">
                 <a:moveTo>
                   <a:pt x="0" y="0"/>
                 </a:moveTo>
                 <a:lnTo>
-                  <a:pt x="7832" y="0"/>
-                </a:lnTo>
-                <a:lnTo>
-                  <a:pt x="7832" y="741"/>
-                </a:lnTo>
-                <a:lnTo>
-                  <a:pt x="0" y="741"/>
+                  <a:pt x="11140" y="0"/>
+                </a:lnTo>
+                <a:lnTo>
+                  <a:pt x="11140" y="1059"/>
+                </a:lnTo>
+                <a:lnTo>
+                  <a:pt x="0" y="1059"/>
                 </a:lnTo>
                 <a:lnTo>
                   <a:pt x="0" y="0"/>
@@ -36067,8 +36729,8 @@
         </p:nvSpPr>
         <p:spPr>
           <a:xfrm>
-            <a:off x="676080" y="2342880"/>
-            <a:ext cx="1324440" cy="267120"/>
+            <a:off x="676080" y="3381120"/>
+            <a:ext cx="1876680" cy="381600"/>
           </a:xfrm>
           <a:custGeom>
             <a:avLst/>
@@ -36076,18 +36738,18 @@
             <a:ahLst/>
             <a:rect l="0" t="0" r="r" b="b"/>
             <a:pathLst>
-              <a:path w="3679" h="742">
+              <a:path w="5213" h="1060">
                 <a:moveTo>
                   <a:pt x="0" y="0"/>
                 </a:moveTo>
                 <a:lnTo>
-                  <a:pt x="3679" y="0"/>
-                </a:lnTo>
-                <a:lnTo>
-                  <a:pt x="3679" y="742"/>
-                </a:lnTo>
-                <a:lnTo>
-                  <a:pt x="0" y="742"/>
+                  <a:pt x="5213" y="0"/>
+                </a:lnTo>
+                <a:lnTo>
+                  <a:pt x="5213" y="1060"/>
+                </a:lnTo>
+                <a:lnTo>
+                  <a:pt x="0" y="1060"/>
                 </a:lnTo>
                 <a:lnTo>
                   <a:pt x="0" y="0"/>
@@ -36129,8 +36791,8 @@
         </p:nvSpPr>
         <p:spPr>
           <a:xfrm>
-            <a:off x="2000160" y="2342880"/>
-            <a:ext cx="1076760" cy="267120"/>
+            <a:off x="2552400" y="3381120"/>
+            <a:ext cx="1533960" cy="381600"/>
           </a:xfrm>
           <a:custGeom>
             <a:avLst/>
@@ -36138,18 +36800,18 @@
             <a:ahLst/>
             <a:rect l="0" t="0" r="r" b="b"/>
             <a:pathLst>
-              <a:path w="2991" h="742">
+              <a:path w="4261" h="1060">
                 <a:moveTo>
                   <a:pt x="0" y="0"/>
                 </a:moveTo>
                 <a:lnTo>
-                  <a:pt x="2991" y="0"/>
-                </a:lnTo>
-                <a:lnTo>
-                  <a:pt x="2991" y="742"/>
-                </a:lnTo>
-                <a:lnTo>
-                  <a:pt x="0" y="742"/>
+                  <a:pt x="4261" y="0"/>
+                </a:lnTo>
+                <a:lnTo>
+                  <a:pt x="4261" y="1060"/>
+                </a:lnTo>
+                <a:lnTo>
+                  <a:pt x="0" y="1060"/>
                 </a:lnTo>
                 <a:lnTo>
                   <a:pt x="0" y="0"/>
@@ -36191,8 +36853,8 @@
         </p:nvSpPr>
         <p:spPr>
           <a:xfrm>
-            <a:off x="3076560" y="2342880"/>
-            <a:ext cx="2819520" cy="267120"/>
+            <a:off x="4086000" y="3381120"/>
+            <a:ext cx="4010400" cy="381600"/>
           </a:xfrm>
           <a:custGeom>
             <a:avLst/>
@@ -36200,18 +36862,18 @@
             <a:ahLst/>
             <a:rect l="0" t="0" r="r" b="b"/>
             <a:pathLst>
-              <a:path w="7832" h="742">
+              <a:path w="11140" h="1060">
                 <a:moveTo>
                   <a:pt x="0" y="0"/>
                 </a:moveTo>
                 <a:lnTo>
-                  <a:pt x="7832" y="0"/>
-                </a:lnTo>
-                <a:lnTo>
-                  <a:pt x="7832" y="742"/>
-                </a:lnTo>
-                <a:lnTo>
-                  <a:pt x="0" y="742"/>
+                  <a:pt x="11140" y="0"/>
+                </a:lnTo>
+                <a:lnTo>
+                  <a:pt x="11140" y="1060"/>
+                </a:lnTo>
+                <a:lnTo>
+                  <a:pt x="0" y="1060"/>
                 </a:lnTo>
                 <a:lnTo>
                   <a:pt x="0" y="0"/>
@@ -36253,8 +36915,8 @@
         </p:nvSpPr>
         <p:spPr>
           <a:xfrm>
-            <a:off x="666720" y="1542960"/>
-            <a:ext cx="9720" cy="276480"/>
+            <a:off x="666720" y="2228760"/>
+            <a:ext cx="9720" cy="390960"/>
           </a:xfrm>
           <a:custGeom>
             <a:avLst/>
@@ -36262,7 +36924,7 @@
             <a:ahLst/>
             <a:rect l="0" t="0" r="r" b="b"/>
             <a:pathLst>
-              <a:path w="27" h="768">
+              <a:path w="27" h="1086">
                 <a:moveTo>
                   <a:pt x="0" y="0"/>
                 </a:moveTo>
@@ -36270,10 +36932,10 @@
                   <a:pt x="27" y="0"/>
                 </a:lnTo>
                 <a:lnTo>
-                  <a:pt x="27" y="768"/>
-                </a:lnTo>
-                <a:lnTo>
-                  <a:pt x="0" y="768"/>
+                  <a:pt x="27" y="1086"/>
+                </a:lnTo>
+                <a:lnTo>
+                  <a:pt x="0" y="1086"/>
                 </a:lnTo>
                 <a:lnTo>
                   <a:pt x="0" y="0"/>
@@ -36313,8 +36975,8 @@
         </p:nvSpPr>
         <p:spPr>
           <a:xfrm>
-            <a:off x="666720" y="1542960"/>
-            <a:ext cx="1333800" cy="9720"/>
+            <a:off x="666720" y="2228760"/>
+            <a:ext cx="1895760" cy="9720"/>
           </a:xfrm>
           <a:custGeom>
             <a:avLst/>
@@ -36322,15 +36984,15 @@
             <a:ahLst/>
             <a:rect l="0" t="0" r="r" b="b"/>
             <a:pathLst>
-              <a:path w="3705" h="27">
+              <a:path w="5266" h="27">
                 <a:moveTo>
                   <a:pt x="0" y="0"/>
                 </a:moveTo>
                 <a:lnTo>
-                  <a:pt x="3705" y="0"/>
-                </a:lnTo>
-                <a:lnTo>
-                  <a:pt x="3705" y="27"/>
+                  <a:pt x="5266" y="0"/>
+                </a:lnTo>
+                <a:lnTo>
+                  <a:pt x="5266" y="27"/>
                 </a:lnTo>
                 <a:lnTo>
                   <a:pt x="0" y="27"/>
@@ -36373,8 +37035,8 @@
         </p:nvSpPr>
         <p:spPr>
           <a:xfrm>
-            <a:off x="1990440" y="1542960"/>
-            <a:ext cx="10080" cy="276480"/>
+            <a:off x="2552400" y="2228760"/>
+            <a:ext cx="10080" cy="390960"/>
           </a:xfrm>
           <a:custGeom>
             <a:avLst/>
@@ -36382,7 +37044,7 @@
             <a:ahLst/>
             <a:rect l="0" t="0" r="r" b="b"/>
             <a:pathLst>
-              <a:path w="28" h="768">
+              <a:path w="28" h="1086">
                 <a:moveTo>
                   <a:pt x="0" y="0"/>
                 </a:moveTo>
@@ -36390,10 +37052,10 @@
                   <a:pt x="28" y="0"/>
                 </a:lnTo>
                 <a:lnTo>
-                  <a:pt x="28" y="768"/>
-                </a:lnTo>
-                <a:lnTo>
-                  <a:pt x="0" y="768"/>
+                  <a:pt x="28" y="1086"/>
+                </a:lnTo>
+                <a:lnTo>
+                  <a:pt x="0" y="1086"/>
                 </a:lnTo>
                 <a:lnTo>
                   <a:pt x="0" y="0"/>
@@ -36433,8 +37095,8 @@
         </p:nvSpPr>
         <p:spPr>
           <a:xfrm>
-            <a:off x="2000160" y="1542960"/>
-            <a:ext cx="1086120" cy="9720"/>
+            <a:off x="2562120" y="2228760"/>
+            <a:ext cx="1524240" cy="9720"/>
           </a:xfrm>
           <a:custGeom>
             <a:avLst/>
@@ -36442,15 +37104,15 @@
             <a:ahLst/>
             <a:rect l="0" t="0" r="r" b="b"/>
             <a:pathLst>
-              <a:path w="3017" h="27">
+              <a:path w="4234" h="27">
                 <a:moveTo>
                   <a:pt x="0" y="0"/>
                 </a:moveTo>
                 <a:lnTo>
-                  <a:pt x="3017" y="0"/>
-                </a:lnTo>
-                <a:lnTo>
-                  <a:pt x="3017" y="27"/>
+                  <a:pt x="4234" y="0"/>
+                </a:lnTo>
+                <a:lnTo>
+                  <a:pt x="4234" y="27"/>
                 </a:lnTo>
                 <a:lnTo>
                   <a:pt x="0" y="27"/>
@@ -36493,8 +37155,8 @@
         </p:nvSpPr>
         <p:spPr>
           <a:xfrm>
-            <a:off x="3076560" y="1542960"/>
-            <a:ext cx="9720" cy="276480"/>
+            <a:off x="4076640" y="2228760"/>
+            <a:ext cx="9720" cy="390960"/>
           </a:xfrm>
           <a:custGeom>
             <a:avLst/>
@@ -36502,7 +37164,7 @@
             <a:ahLst/>
             <a:rect l="0" t="0" r="r" b="b"/>
             <a:pathLst>
-              <a:path w="27" h="768">
+              <a:path w="27" h="1086">
                 <a:moveTo>
                   <a:pt x="0" y="0"/>
                 </a:moveTo>
@@ -36510,10 +37172,10 @@
                   <a:pt x="27" y="0"/>
                 </a:lnTo>
                 <a:lnTo>
-                  <a:pt x="27" y="768"/>
-                </a:lnTo>
-                <a:lnTo>
-                  <a:pt x="0" y="768"/>
+                  <a:pt x="27" y="1086"/>
+                </a:lnTo>
+                <a:lnTo>
+                  <a:pt x="0" y="1086"/>
                 </a:lnTo>
                 <a:lnTo>
                   <a:pt x="0" y="0"/>
@@ -36553,8 +37215,8 @@
         </p:nvSpPr>
         <p:spPr>
           <a:xfrm>
-            <a:off x="3085920" y="1542960"/>
-            <a:ext cx="2819880" cy="9720"/>
+            <a:off x="4086000" y="2228760"/>
+            <a:ext cx="4010400" cy="9720"/>
           </a:xfrm>
           <a:custGeom>
             <a:avLst/>
@@ -36562,15 +37224,15 @@
             <a:ahLst/>
             <a:rect l="0" t="0" r="r" b="b"/>
             <a:pathLst>
-              <a:path w="7833" h="27">
+              <a:path w="11140" h="27">
                 <a:moveTo>
                   <a:pt x="0" y="0"/>
                 </a:moveTo>
                 <a:lnTo>
-                  <a:pt x="7833" y="0"/>
-                </a:lnTo>
-                <a:lnTo>
-                  <a:pt x="7833" y="27"/>
+                  <a:pt x="11140" y="0"/>
+                </a:lnTo>
+                <a:lnTo>
+                  <a:pt x="11140" y="27"/>
                 </a:lnTo>
                 <a:lnTo>
                   <a:pt x="0" y="27"/>
@@ -36613,8 +37275,8 @@
         </p:nvSpPr>
         <p:spPr>
           <a:xfrm>
-            <a:off x="5895720" y="1542960"/>
-            <a:ext cx="10080" cy="276480"/>
+            <a:off x="8086680" y="2228760"/>
+            <a:ext cx="9720" cy="390960"/>
           </a:xfrm>
           <a:custGeom>
             <a:avLst/>
@@ -36622,18 +37284,18 @@
             <a:ahLst/>
             <a:rect l="0" t="0" r="r" b="b"/>
             <a:pathLst>
-              <a:path w="28" h="768">
+              <a:path w="27" h="1086">
                 <a:moveTo>
                   <a:pt x="0" y="0"/>
                 </a:moveTo>
                 <a:lnTo>
-                  <a:pt x="28" y="0"/>
-                </a:lnTo>
-                <a:lnTo>
-                  <a:pt x="28" y="768"/>
-                </a:lnTo>
-                <a:lnTo>
-                  <a:pt x="0" y="768"/>
+                  <a:pt x="27" y="0"/>
+                </a:lnTo>
+                <a:lnTo>
+                  <a:pt x="27" y="1086"/>
+                </a:lnTo>
+                <a:lnTo>
+                  <a:pt x="0" y="1086"/>
                 </a:lnTo>
                 <a:lnTo>
                   <a:pt x="0" y="0"/>
@@ -36673,8 +37335,8 @@
         </p:nvSpPr>
         <p:spPr>
           <a:xfrm>
-            <a:off x="666720" y="1809720"/>
-            <a:ext cx="1333800" cy="9720"/>
+            <a:off x="666720" y="2609640"/>
+            <a:ext cx="1895760" cy="10080"/>
           </a:xfrm>
           <a:custGeom>
             <a:avLst/>
@@ -36682,18 +37344,18 @@
             <a:ahLst/>
             <a:rect l="0" t="0" r="r" b="b"/>
             <a:pathLst>
-              <a:path w="3705" h="27">
+              <a:path w="5266" h="28">
                 <a:moveTo>
                   <a:pt x="0" y="0"/>
                 </a:moveTo>
                 <a:lnTo>
-                  <a:pt x="3705" y="0"/>
-                </a:lnTo>
-                <a:lnTo>
-                  <a:pt x="3705" y="27"/>
-                </a:lnTo>
-                <a:lnTo>
-                  <a:pt x="0" y="27"/>
+                  <a:pt x="5266" y="0"/>
+                </a:lnTo>
+                <a:lnTo>
+                  <a:pt x="5266" y="28"/>
+                </a:lnTo>
+                <a:lnTo>
+                  <a:pt x="0" y="28"/>
                 </a:lnTo>
                 <a:lnTo>
                   <a:pt x="0" y="0"/>
@@ -36733,8 +37395,8 @@
         </p:nvSpPr>
         <p:spPr>
           <a:xfrm>
-            <a:off x="2000160" y="1809720"/>
-            <a:ext cx="1086120" cy="9720"/>
+            <a:off x="2562120" y="2609640"/>
+            <a:ext cx="1524240" cy="10080"/>
           </a:xfrm>
           <a:custGeom>
             <a:avLst/>
@@ -36742,18 +37404,18 @@
             <a:ahLst/>
             <a:rect l="0" t="0" r="r" b="b"/>
             <a:pathLst>
-              <a:path w="3017" h="27">
+              <a:path w="4234" h="28">
                 <a:moveTo>
                   <a:pt x="0" y="0"/>
                 </a:moveTo>
                 <a:lnTo>
-                  <a:pt x="3017" y="0"/>
-                </a:lnTo>
-                <a:lnTo>
-                  <a:pt x="3017" y="27"/>
-                </a:lnTo>
-                <a:lnTo>
-                  <a:pt x="0" y="27"/>
+                  <a:pt x="4234" y="0"/>
+                </a:lnTo>
+                <a:lnTo>
+                  <a:pt x="4234" y="28"/>
+                </a:lnTo>
+                <a:lnTo>
+                  <a:pt x="0" y="28"/>
                 </a:lnTo>
                 <a:lnTo>
                   <a:pt x="0" y="0"/>
@@ -36793,8 +37455,8 @@
         </p:nvSpPr>
         <p:spPr>
           <a:xfrm>
-            <a:off x="3085920" y="1809720"/>
-            <a:ext cx="2819880" cy="9720"/>
+            <a:off x="4086000" y="2609640"/>
+            <a:ext cx="4010400" cy="10080"/>
           </a:xfrm>
           <a:custGeom>
             <a:avLst/>
@@ -36802,18 +37464,18 @@
             <a:ahLst/>
             <a:rect l="0" t="0" r="r" b="b"/>
             <a:pathLst>
-              <a:path w="7833" h="27">
+              <a:path w="11140" h="28">
                 <a:moveTo>
                   <a:pt x="0" y="0"/>
                 </a:moveTo>
                 <a:lnTo>
-                  <a:pt x="7833" y="0"/>
-                </a:lnTo>
-                <a:lnTo>
-                  <a:pt x="7833" y="27"/>
-                </a:lnTo>
-                <a:lnTo>
-                  <a:pt x="0" y="27"/>
+                  <a:pt x="11140" y="0"/>
+                </a:lnTo>
+                <a:lnTo>
+                  <a:pt x="11140" y="28"/>
+                </a:lnTo>
+                <a:lnTo>
+                  <a:pt x="0" y="28"/>
                 </a:lnTo>
                 <a:lnTo>
                   <a:pt x="0" y="0"/>
@@ -36853,8 +37515,8 @@
         </p:nvSpPr>
         <p:spPr>
           <a:xfrm>
-            <a:off x="666720" y="1819080"/>
-            <a:ext cx="9720" cy="267120"/>
+            <a:off x="666720" y="2619360"/>
+            <a:ext cx="9720" cy="381240"/>
           </a:xfrm>
           <a:custGeom>
             <a:avLst/>
@@ -36862,7 +37524,7 @@
             <a:ahLst/>
             <a:rect l="0" t="0" r="r" b="b"/>
             <a:pathLst>
-              <a:path w="27" h="742">
+              <a:path w="27" h="1059">
                 <a:moveTo>
                   <a:pt x="0" y="0"/>
                 </a:moveTo>
@@ -36870,10 +37532,10 @@
                   <a:pt x="27" y="0"/>
                 </a:lnTo>
                 <a:lnTo>
-                  <a:pt x="27" y="742"/>
-                </a:lnTo>
-                <a:lnTo>
-                  <a:pt x="0" y="742"/>
+                  <a:pt x="27" y="1059"/>
+                </a:lnTo>
+                <a:lnTo>
+                  <a:pt x="0" y="1059"/>
                 </a:lnTo>
                 <a:lnTo>
                   <a:pt x="0" y="0"/>
@@ -36913,8 +37575,8 @@
         </p:nvSpPr>
         <p:spPr>
           <a:xfrm>
-            <a:off x="1990440" y="1819080"/>
-            <a:ext cx="10080" cy="267120"/>
+            <a:off x="2552400" y="2619360"/>
+            <a:ext cx="10080" cy="381240"/>
           </a:xfrm>
           <a:custGeom>
             <a:avLst/>
@@ -36922,7 +37584,7 @@
             <a:ahLst/>
             <a:rect l="0" t="0" r="r" b="b"/>
             <a:pathLst>
-              <a:path w="28" h="742">
+              <a:path w="28" h="1059">
                 <a:moveTo>
                   <a:pt x="0" y="0"/>
                 </a:moveTo>
@@ -36930,10 +37592,10 @@
                   <a:pt x="28" y="0"/>
                 </a:lnTo>
                 <a:lnTo>
-                  <a:pt x="28" y="742"/>
-                </a:lnTo>
-                <a:lnTo>
-                  <a:pt x="0" y="742"/>
+                  <a:pt x="28" y="1059"/>
+                </a:lnTo>
+                <a:lnTo>
+                  <a:pt x="0" y="1059"/>
                 </a:lnTo>
                 <a:lnTo>
                   <a:pt x="0" y="0"/>
@@ -36973,8 +37635,8 @@
         </p:nvSpPr>
         <p:spPr>
           <a:xfrm>
-            <a:off x="3076560" y="1819080"/>
-            <a:ext cx="9720" cy="267120"/>
+            <a:off x="4076640" y="2619360"/>
+            <a:ext cx="9720" cy="381240"/>
           </a:xfrm>
           <a:custGeom>
             <a:avLst/>
@@ -36982,7 +37644,7 @@
             <a:ahLst/>
             <a:rect l="0" t="0" r="r" b="b"/>
             <a:pathLst>
-              <a:path w="27" h="742">
+              <a:path w="27" h="1059">
                 <a:moveTo>
                   <a:pt x="0" y="0"/>
                 </a:moveTo>
@@ -36990,10 +37652,10 @@
                   <a:pt x="27" y="0"/>
                 </a:lnTo>
                 <a:lnTo>
-                  <a:pt x="27" y="742"/>
-                </a:lnTo>
-                <a:lnTo>
-                  <a:pt x="0" y="742"/>
+                  <a:pt x="27" y="1059"/>
+                </a:lnTo>
+                <a:lnTo>
+                  <a:pt x="0" y="1059"/>
                 </a:lnTo>
                 <a:lnTo>
                   <a:pt x="0" y="0"/>
@@ -37033,8 +37695,8 @@
         </p:nvSpPr>
         <p:spPr>
           <a:xfrm>
-            <a:off x="5895720" y="1819080"/>
-            <a:ext cx="10080" cy="267120"/>
+            <a:off x="8086680" y="2619360"/>
+            <a:ext cx="9720" cy="381240"/>
           </a:xfrm>
           <a:custGeom>
             <a:avLst/>
@@ -37042,18 +37704,18 @@
             <a:ahLst/>
             <a:rect l="0" t="0" r="r" b="b"/>
             <a:pathLst>
-              <a:path w="28" h="742">
+              <a:path w="27" h="1059">
                 <a:moveTo>
                   <a:pt x="0" y="0"/>
                 </a:moveTo>
                 <a:lnTo>
-                  <a:pt x="28" y="0"/>
-                </a:lnTo>
-                <a:lnTo>
-                  <a:pt x="28" y="742"/>
-                </a:lnTo>
-                <a:lnTo>
-                  <a:pt x="0" y="742"/>
+                  <a:pt x="27" y="0"/>
+                </a:lnTo>
+                <a:lnTo>
+                  <a:pt x="27" y="1059"/>
+                </a:lnTo>
+                <a:lnTo>
+                  <a:pt x="0" y="1059"/>
                 </a:lnTo>
                 <a:lnTo>
                   <a:pt x="0" y="0"/>
@@ -37093,8 +37755,8 @@
         </p:nvSpPr>
         <p:spPr>
           <a:xfrm>
-            <a:off x="666720" y="2085840"/>
-            <a:ext cx="9720" cy="267120"/>
+            <a:off x="666720" y="3000240"/>
+            <a:ext cx="9720" cy="390960"/>
           </a:xfrm>
           <a:custGeom>
             <a:avLst/>
@@ -37102,7 +37764,7 @@
             <a:ahLst/>
             <a:rect l="0" t="0" r="r" b="b"/>
             <a:pathLst>
-              <a:path w="27" h="742">
+              <a:path w="27" h="1086">
                 <a:moveTo>
                   <a:pt x="0" y="0"/>
                 </a:moveTo>
@@ -37110,10 +37772,10 @@
                   <a:pt x="27" y="0"/>
                 </a:lnTo>
                 <a:lnTo>
-                  <a:pt x="27" y="742"/>
-                </a:lnTo>
-                <a:lnTo>
-                  <a:pt x="0" y="742"/>
+                  <a:pt x="27" y="1086"/>
+                </a:lnTo>
+                <a:lnTo>
+                  <a:pt x="0" y="1086"/>
                 </a:lnTo>
                 <a:lnTo>
                   <a:pt x="0" y="0"/>
@@ -37153,8 +37815,8 @@
         </p:nvSpPr>
         <p:spPr>
           <a:xfrm>
-            <a:off x="666720" y="2076120"/>
-            <a:ext cx="1333800" cy="10080"/>
+            <a:off x="666720" y="2990520"/>
+            <a:ext cx="1895760" cy="10080"/>
           </a:xfrm>
           <a:custGeom>
             <a:avLst/>
@@ -37162,15 +37824,15 @@
             <a:ahLst/>
             <a:rect l="0" t="0" r="r" b="b"/>
             <a:pathLst>
-              <a:path w="3705" h="28">
+              <a:path w="5266" h="28">
                 <a:moveTo>
                   <a:pt x="0" y="0"/>
                 </a:moveTo>
                 <a:lnTo>
-                  <a:pt x="3705" y="0"/>
-                </a:lnTo>
-                <a:lnTo>
-                  <a:pt x="3705" y="28"/>
+                  <a:pt x="5266" y="0"/>
+                </a:lnTo>
+                <a:lnTo>
+                  <a:pt x="5266" y="28"/>
                 </a:lnTo>
                 <a:lnTo>
                   <a:pt x="0" y="28"/>
@@ -37213,8 +37875,8 @@
         </p:nvSpPr>
         <p:spPr>
           <a:xfrm>
-            <a:off x="1990440" y="2085840"/>
-            <a:ext cx="10080" cy="267120"/>
+            <a:off x="2552400" y="3000240"/>
+            <a:ext cx="10080" cy="390960"/>
           </a:xfrm>
           <a:custGeom>
             <a:avLst/>
@@ -37222,7 +37884,7 @@
             <a:ahLst/>
             <a:rect l="0" t="0" r="r" b="b"/>
             <a:pathLst>
-              <a:path w="28" h="742">
+              <a:path w="28" h="1086">
                 <a:moveTo>
                   <a:pt x="0" y="0"/>
                 </a:moveTo>
@@ -37230,10 +37892,10 @@
                   <a:pt x="28" y="0"/>
                 </a:lnTo>
                 <a:lnTo>
-                  <a:pt x="28" y="742"/>
-                </a:lnTo>
-                <a:lnTo>
-                  <a:pt x="0" y="742"/>
+                  <a:pt x="28" y="1086"/>
+                </a:lnTo>
+                <a:lnTo>
+                  <a:pt x="0" y="1086"/>
                 </a:lnTo>
                 <a:lnTo>
                   <a:pt x="0" y="0"/>
@@ -37273,8 +37935,8 @@
         </p:nvSpPr>
         <p:spPr>
           <a:xfrm>
-            <a:off x="2000160" y="2076120"/>
-            <a:ext cx="1086120" cy="10080"/>
+            <a:off x="2562120" y="2990520"/>
+            <a:ext cx="1524240" cy="10080"/>
           </a:xfrm>
           <a:custGeom>
             <a:avLst/>
@@ -37282,15 +37944,15 @@
             <a:ahLst/>
             <a:rect l="0" t="0" r="r" b="b"/>
             <a:pathLst>
-              <a:path w="3017" h="28">
+              <a:path w="4234" h="28">
                 <a:moveTo>
                   <a:pt x="0" y="0"/>
                 </a:moveTo>
                 <a:lnTo>
-                  <a:pt x="3017" y="0"/>
-                </a:lnTo>
-                <a:lnTo>
-                  <a:pt x="3017" y="28"/>
+                  <a:pt x="4234" y="0"/>
+                </a:lnTo>
+                <a:lnTo>
+                  <a:pt x="4234" y="28"/>
                 </a:lnTo>
                 <a:lnTo>
                   <a:pt x="0" y="28"/>
@@ -37333,8 +37995,8 @@
         </p:nvSpPr>
         <p:spPr>
           <a:xfrm>
-            <a:off x="3076560" y="2085840"/>
-            <a:ext cx="9720" cy="267120"/>
+            <a:off x="4076640" y="3000240"/>
+            <a:ext cx="9720" cy="390960"/>
           </a:xfrm>
           <a:custGeom>
             <a:avLst/>
@@ -37342,7 +38004,7 @@
             <a:ahLst/>
             <a:rect l="0" t="0" r="r" b="b"/>
             <a:pathLst>
-              <a:path w="27" h="742">
+              <a:path w="27" h="1086">
                 <a:moveTo>
                   <a:pt x="0" y="0"/>
                 </a:moveTo>
@@ -37350,10 +38012,10 @@
                   <a:pt x="27" y="0"/>
                 </a:lnTo>
                 <a:lnTo>
-                  <a:pt x="27" y="742"/>
-                </a:lnTo>
-                <a:lnTo>
-                  <a:pt x="0" y="742"/>
+                  <a:pt x="27" y="1086"/>
+                </a:lnTo>
+                <a:lnTo>
+                  <a:pt x="0" y="1086"/>
                 </a:lnTo>
                 <a:lnTo>
                   <a:pt x="0" y="0"/>
@@ -37393,8 +38055,8 @@
         </p:nvSpPr>
         <p:spPr>
           <a:xfrm>
-            <a:off x="3085920" y="2076120"/>
-            <a:ext cx="2819880" cy="10080"/>
+            <a:off x="4086000" y="2990520"/>
+            <a:ext cx="4010400" cy="10080"/>
           </a:xfrm>
           <a:custGeom>
             <a:avLst/>
@@ -37402,15 +38064,15 @@
             <a:ahLst/>
             <a:rect l="0" t="0" r="r" b="b"/>
             <a:pathLst>
-              <a:path w="7833" h="28">
+              <a:path w="11140" h="28">
                 <a:moveTo>
                   <a:pt x="0" y="0"/>
                 </a:moveTo>
                 <a:lnTo>
-                  <a:pt x="7833" y="0"/>
-                </a:lnTo>
-                <a:lnTo>
-                  <a:pt x="7833" y="28"/>
+                  <a:pt x="11140" y="0"/>
+                </a:lnTo>
+                <a:lnTo>
+                  <a:pt x="11140" y="28"/>
                 </a:lnTo>
                 <a:lnTo>
                   <a:pt x="0" y="28"/>
@@ -37453,8 +38115,8 @@
         </p:nvSpPr>
         <p:spPr>
           <a:xfrm>
-            <a:off x="5895720" y="2085840"/>
-            <a:ext cx="10080" cy="267120"/>
+            <a:off x="8086680" y="3000240"/>
+            <a:ext cx="9720" cy="390960"/>
           </a:xfrm>
           <a:custGeom>
             <a:avLst/>
@@ -37462,18 +38124,18 @@
             <a:ahLst/>
             <a:rect l="0" t="0" r="r" b="b"/>
             <a:pathLst>
-              <a:path w="28" h="742">
+              <a:path w="27" h="1086">
                 <a:moveTo>
                   <a:pt x="0" y="0"/>
                 </a:moveTo>
                 <a:lnTo>
-                  <a:pt x="28" y="0"/>
-                </a:lnTo>
-                <a:lnTo>
-                  <a:pt x="28" y="742"/>
-                </a:lnTo>
-                <a:lnTo>
-                  <a:pt x="0" y="742"/>
+                  <a:pt x="27" y="0"/>
+                </a:lnTo>
+                <a:lnTo>
+                  <a:pt x="27" y="1086"/>
+                </a:lnTo>
+                <a:lnTo>
+                  <a:pt x="0" y="1086"/>
                 </a:lnTo>
                 <a:lnTo>
                   <a:pt x="0" y="0"/>
@@ -37513,8 +38175,8 @@
         </p:nvSpPr>
         <p:spPr>
           <a:xfrm>
-            <a:off x="666720" y="2352600"/>
-            <a:ext cx="9720" cy="267120"/>
+            <a:off x="666720" y="3390840"/>
+            <a:ext cx="9720" cy="381240"/>
           </a:xfrm>
           <a:custGeom>
             <a:avLst/>
@@ -37522,7 +38184,7 @@
             <a:ahLst/>
             <a:rect l="0" t="0" r="r" b="b"/>
             <a:pathLst>
-              <a:path w="27" h="742">
+              <a:path w="27" h="1059">
                 <a:moveTo>
                   <a:pt x="0" y="0"/>
                 </a:moveTo>
@@ -37530,10 +38192,10 @@
                   <a:pt x="27" y="0"/>
                 </a:lnTo>
                 <a:lnTo>
-                  <a:pt x="27" y="742"/>
-                </a:lnTo>
-                <a:lnTo>
-                  <a:pt x="0" y="742"/>
+                  <a:pt x="27" y="1059"/>
+                </a:lnTo>
+                <a:lnTo>
+                  <a:pt x="0" y="1059"/>
                 </a:lnTo>
                 <a:lnTo>
                   <a:pt x="0" y="0"/>
@@ -37573,8 +38235,8 @@
         </p:nvSpPr>
         <p:spPr>
           <a:xfrm>
-            <a:off x="666720" y="2342880"/>
-            <a:ext cx="1333800" cy="10080"/>
+            <a:off x="666720" y="3381120"/>
+            <a:ext cx="1895760" cy="10080"/>
           </a:xfrm>
           <a:custGeom>
             <a:avLst/>
@@ -37582,15 +38244,15 @@
             <a:ahLst/>
             <a:rect l="0" t="0" r="r" b="b"/>
             <a:pathLst>
-              <a:path w="3705" h="28">
+              <a:path w="5266" h="28">
                 <a:moveTo>
                   <a:pt x="0" y="0"/>
                 </a:moveTo>
                 <a:lnTo>
-                  <a:pt x="3705" y="0"/>
-                </a:lnTo>
-                <a:lnTo>
-                  <a:pt x="3705" y="28"/>
+                  <a:pt x="5266" y="0"/>
+                </a:lnTo>
+                <a:lnTo>
+                  <a:pt x="5266" y="28"/>
                 </a:lnTo>
                 <a:lnTo>
                   <a:pt x="0" y="28"/>
@@ -37633,8 +38295,8 @@
         </p:nvSpPr>
         <p:spPr>
           <a:xfrm>
-            <a:off x="1990440" y="2352600"/>
-            <a:ext cx="10080" cy="267120"/>
+            <a:off x="2552400" y="3390840"/>
+            <a:ext cx="10080" cy="381240"/>
           </a:xfrm>
           <a:custGeom>
             <a:avLst/>
@@ -37642,7 +38304,7 @@
             <a:ahLst/>
             <a:rect l="0" t="0" r="r" b="b"/>
             <a:pathLst>
-              <a:path w="28" h="742">
+              <a:path w="28" h="1059">
                 <a:moveTo>
                   <a:pt x="0" y="0"/>
                 </a:moveTo>
@@ -37650,10 +38312,10 @@
                   <a:pt x="28" y="0"/>
                 </a:lnTo>
                 <a:lnTo>
-                  <a:pt x="28" y="742"/>
-                </a:lnTo>
-                <a:lnTo>
-                  <a:pt x="0" y="742"/>
+                  <a:pt x="28" y="1059"/>
+                </a:lnTo>
+                <a:lnTo>
+                  <a:pt x="0" y="1059"/>
                 </a:lnTo>
                 <a:lnTo>
                   <a:pt x="0" y="0"/>
@@ -37693,8 +38355,8 @@
         </p:nvSpPr>
         <p:spPr>
           <a:xfrm>
-            <a:off x="2000160" y="2342880"/>
-            <a:ext cx="1086120" cy="10080"/>
+            <a:off x="2562120" y="3381120"/>
+            <a:ext cx="1524240" cy="10080"/>
           </a:xfrm>
           <a:custGeom>
             <a:avLst/>
@@ -37702,15 +38364,15 @@
             <a:ahLst/>
             <a:rect l="0" t="0" r="r" b="b"/>
             <a:pathLst>
-              <a:path w="3017" h="28">
+              <a:path w="4234" h="28">
                 <a:moveTo>
                   <a:pt x="0" y="0"/>
                 </a:moveTo>
                 <a:lnTo>
-                  <a:pt x="3017" y="0"/>
-                </a:lnTo>
-                <a:lnTo>
-                  <a:pt x="3017" y="28"/>
+                  <a:pt x="4234" y="0"/>
+                </a:lnTo>
+                <a:lnTo>
+                  <a:pt x="4234" y="28"/>
                 </a:lnTo>
                 <a:lnTo>
                   <a:pt x="0" y="28"/>
@@ -37753,8 +38415,8 @@
         </p:nvSpPr>
         <p:spPr>
           <a:xfrm>
-            <a:off x="3076560" y="2352600"/>
-            <a:ext cx="9720" cy="267120"/>
+            <a:off x="4076640" y="3390840"/>
+            <a:ext cx="9720" cy="381240"/>
           </a:xfrm>
           <a:custGeom>
             <a:avLst/>
@@ -37762,7 +38424,7 @@
             <a:ahLst/>
             <a:rect l="0" t="0" r="r" b="b"/>
             <a:pathLst>
-              <a:path w="27" h="742">
+              <a:path w="27" h="1059">
                 <a:moveTo>
                   <a:pt x="0" y="0"/>
                 </a:moveTo>
@@ -37770,10 +38432,10 @@
                   <a:pt x="27" y="0"/>
                 </a:lnTo>
                 <a:lnTo>
-                  <a:pt x="27" y="742"/>
-                </a:lnTo>
-                <a:lnTo>
-                  <a:pt x="0" y="742"/>
+                  <a:pt x="27" y="1059"/>
+                </a:lnTo>
+                <a:lnTo>
+                  <a:pt x="0" y="1059"/>
                 </a:lnTo>
                 <a:lnTo>
                   <a:pt x="0" y="0"/>
@@ -37813,8 +38475,8 @@
         </p:nvSpPr>
         <p:spPr>
           <a:xfrm>
-            <a:off x="3085920" y="2342880"/>
-            <a:ext cx="2819880" cy="10080"/>
+            <a:off x="4086000" y="3381120"/>
+            <a:ext cx="4010400" cy="10080"/>
           </a:xfrm>
           <a:custGeom>
             <a:avLst/>
@@ -37822,15 +38484,15 @@
             <a:ahLst/>
             <a:rect l="0" t="0" r="r" b="b"/>
             <a:pathLst>
-              <a:path w="7833" h="28">
+              <a:path w="11140" h="28">
                 <a:moveTo>
                   <a:pt x="0" y="0"/>
                 </a:moveTo>
                 <a:lnTo>
-                  <a:pt x="7833" y="0"/>
-                </a:lnTo>
-                <a:lnTo>
-                  <a:pt x="7833" y="28"/>
+                  <a:pt x="11140" y="0"/>
+                </a:lnTo>
+                <a:lnTo>
+                  <a:pt x="11140" y="28"/>
                 </a:lnTo>
                 <a:lnTo>
                   <a:pt x="0" y="28"/>
@@ -37873,8 +38535,8 @@
         </p:nvSpPr>
         <p:spPr>
           <a:xfrm>
-            <a:off x="5895720" y="2352600"/>
-            <a:ext cx="10080" cy="267120"/>
+            <a:off x="8086680" y="3390840"/>
+            <a:ext cx="9720" cy="381240"/>
           </a:xfrm>
           <a:custGeom>
             <a:avLst/>
@@ -37882,18 +38544,18 @@
             <a:ahLst/>
             <a:rect l="0" t="0" r="r" b="b"/>
             <a:pathLst>
-              <a:path w="28" h="742">
+              <a:path w="27" h="1059">
                 <a:moveTo>
                   <a:pt x="0" y="0"/>
                 </a:moveTo>
                 <a:lnTo>
-                  <a:pt x="28" y="0"/>
-                </a:lnTo>
-                <a:lnTo>
-                  <a:pt x="28" y="742"/>
-                </a:lnTo>
-                <a:lnTo>
-                  <a:pt x="0" y="742"/>
+                  <a:pt x="27" y="0"/>
+                </a:lnTo>
+                <a:lnTo>
+                  <a:pt x="27" y="1059"/>
+                </a:lnTo>
+                <a:lnTo>
+                  <a:pt x="0" y="1059"/>
                 </a:lnTo>
                 <a:lnTo>
                   <a:pt x="0" y="0"/>
@@ -37933,8 +38595,8 @@
         </p:nvSpPr>
         <p:spPr>
           <a:xfrm>
-            <a:off x="666720" y="2609640"/>
-            <a:ext cx="1333800" cy="10080"/>
+            <a:off x="666720" y="3762360"/>
+            <a:ext cx="1895760" cy="9720"/>
           </a:xfrm>
           <a:custGeom>
             <a:avLst/>
@@ -37942,18 +38604,18 @@
             <a:ahLst/>
             <a:rect l="0" t="0" r="r" b="b"/>
             <a:pathLst>
-              <a:path w="3705" h="28">
+              <a:path w="5266" h="27">
                 <a:moveTo>
                   <a:pt x="0" y="0"/>
                 </a:moveTo>
                 <a:lnTo>
-                  <a:pt x="3705" y="0"/>
-                </a:lnTo>
-                <a:lnTo>
-                  <a:pt x="3705" y="28"/>
-                </a:lnTo>
-                <a:lnTo>
-                  <a:pt x="0" y="28"/>
+                  <a:pt x="5266" y="0"/>
+                </a:lnTo>
+                <a:lnTo>
+                  <a:pt x="5266" y="27"/>
+                </a:lnTo>
+                <a:lnTo>
+                  <a:pt x="0" y="27"/>
                 </a:lnTo>
                 <a:lnTo>
                   <a:pt x="0" y="0"/>
@@ -37993,8 +38655,8 @@
         </p:nvSpPr>
         <p:spPr>
           <a:xfrm>
-            <a:off x="2000160" y="2609640"/>
-            <a:ext cx="1086120" cy="10080"/>
+            <a:off x="2562120" y="3762360"/>
+            <a:ext cx="1524240" cy="9720"/>
           </a:xfrm>
           <a:custGeom>
             <a:avLst/>
@@ -38002,18 +38664,18 @@
             <a:ahLst/>
             <a:rect l="0" t="0" r="r" b="b"/>
             <a:pathLst>
-              <a:path w="3017" h="28">
+              <a:path w="4234" h="27">
                 <a:moveTo>
                   <a:pt x="0" y="0"/>
                 </a:moveTo>
                 <a:lnTo>
-                  <a:pt x="3017" y="0"/>
-                </a:lnTo>
-                <a:lnTo>
-                  <a:pt x="3017" y="28"/>
-                </a:lnTo>
-                <a:lnTo>
-                  <a:pt x="0" y="28"/>
+                  <a:pt x="4234" y="0"/>
+                </a:lnTo>
+                <a:lnTo>
+                  <a:pt x="4234" y="27"/>
+                </a:lnTo>
+                <a:lnTo>
+                  <a:pt x="0" y="27"/>
                 </a:lnTo>
                 <a:lnTo>
                   <a:pt x="0" y="0"/>
@@ -38053,8 +38715,8 @@
         </p:nvSpPr>
         <p:spPr>
           <a:xfrm>
-            <a:off x="3085920" y="2609640"/>
-            <a:ext cx="2819880" cy="10080"/>
+            <a:off x="4086000" y="3762360"/>
+            <a:ext cx="4010400" cy="9720"/>
           </a:xfrm>
           <a:custGeom>
             <a:avLst/>
@@ -38062,18 +38724,18 @@
             <a:ahLst/>
             <a:rect l="0" t="0" r="r" b="b"/>
             <a:pathLst>
-              <a:path w="7833" h="28">
+              <a:path w="11140" h="27">
                 <a:moveTo>
                   <a:pt x="0" y="0"/>
                 </a:moveTo>
                 <a:lnTo>
-                  <a:pt x="7833" y="0"/>
-                </a:lnTo>
-                <a:lnTo>
-                  <a:pt x="7833" y="28"/>
-                </a:lnTo>
-                <a:lnTo>
-                  <a:pt x="0" y="28"/>
+                  <a:pt x="11140" y="0"/>
+                </a:lnTo>
+                <a:lnTo>
+                  <a:pt x="11140" y="27"/>
+                </a:lnTo>
+                <a:lnTo>
+                  <a:pt x="0" y="27"/>
                 </a:lnTo>
                 <a:lnTo>
                   <a:pt x="0" y="0"/>
@@ -38113,8 +38775,8 @@
         </p:nvSpPr>
         <p:spPr>
           <a:xfrm>
-            <a:off x="666720" y="638280"/>
-            <a:ext cx="1761120" cy="378360"/>
+            <a:off x="666720" y="629640"/>
+            <a:ext cx="3201120" cy="686160"/>
           </a:xfrm>
           <a:prstGeom prst="rect">
             <a:avLst/>
@@ -38130,7 +38792,7 @@
           </a:bodyPr>
           <a:p>
             <a:r>
-              <a:rPr b="1" lang="ja-JP" sz="1979" strike="noStrike" u="none">
+              <a:rPr b="1" lang="ja-JP" sz="3600" strike="noStrike" u="none">
                 <a:solidFill>
                   <a:srgbClr val="0078d4"/>
                 </a:solidFill>
@@ -38141,7 +38803,7 @@
               </a:rPr>
               <a:t>認証技術の進化</a:t>
             </a:r>
-            <a:endParaRPr b="0" lang="en-US" sz="1979" strike="noStrike" u="none">
+            <a:endParaRPr b="0" lang="en-US" sz="3600" strike="noStrike" u="none">
               <a:solidFill>
                 <a:srgbClr val="000000"/>
               </a:solidFill>
@@ -38160,8 +38822,8 @@
         </p:nvSpPr>
         <p:spPr>
           <a:xfrm>
-            <a:off x="666720" y="1092240"/>
-            <a:ext cx="3423960" cy="312840"/>
+            <a:off x="666720" y="1456560"/>
+            <a:ext cx="6497640" cy="594720"/>
           </a:xfrm>
           <a:prstGeom prst="rect">
             <a:avLst/>
@@ -38177,7 +38839,7 @@
           </a:bodyPr>
           <a:p>
             <a:r>
-              <a:rPr b="1" lang="en-US" sz="1650" strike="noStrike" u="none">
+              <a:rPr b="1" lang="en-US" sz="3120" strike="noStrike" u="none">
                 <a:solidFill>
                   <a:srgbClr val="0078d4"/>
                 </a:solidFill>
@@ -38189,7 +38851,7 @@
               <a:t>Kerberos → NTLM → </a:t>
             </a:r>
             <a:r>
-              <a:rPr b="1" lang="ja-JP" sz="1650" strike="noStrike" u="none">
+              <a:rPr b="1" lang="ja-JP" sz="3120" strike="noStrike" u="none">
                 <a:solidFill>
                   <a:srgbClr val="0078d4"/>
                 </a:solidFill>
@@ -38200,7 +38862,7 @@
               </a:rPr>
               <a:t>証明書認証</a:t>
             </a:r>
-            <a:endParaRPr b="0" lang="en-US" sz="1650" strike="noStrike" u="none">
+            <a:endParaRPr b="0" lang="en-US" sz="3120" strike="noStrike" u="none">
               <a:solidFill>
                 <a:srgbClr val="000000"/>
               </a:solidFill>
@@ -38219,8 +38881,8 @@
         </p:nvSpPr>
         <p:spPr>
           <a:xfrm>
-            <a:off x="1176120" y="1559160"/>
-            <a:ext cx="293400" cy="219960"/>
+            <a:off x="1387080" y="2269440"/>
+            <a:ext cx="427320" cy="320400"/>
           </a:xfrm>
           <a:prstGeom prst="rect">
             <a:avLst/>
@@ -38236,7 +38898,7 @@
           </a:bodyPr>
           <a:p>
             <a:r>
-              <a:rPr b="1" lang="ja-JP" sz="1150" strike="noStrike" u="none">
+              <a:rPr b="1" lang="ja-JP" sz="1679" strike="noStrike" u="none">
                 <a:solidFill>
                   <a:srgbClr val="fff8e1"/>
                 </a:solidFill>
@@ -38247,7 +38909,7 @@
               </a:rPr>
               <a:t>世代</a:t>
             </a:r>
-            <a:endParaRPr b="0" lang="en-US" sz="1150" strike="noStrike" u="none">
+            <a:endParaRPr b="0" lang="en-US" sz="1679" strike="noStrike" u="none">
               <a:solidFill>
                 <a:srgbClr val="000000"/>
               </a:solidFill>
@@ -38266,8 +38928,8 @@
         </p:nvSpPr>
         <p:spPr>
           <a:xfrm>
-            <a:off x="2220120" y="1559160"/>
-            <a:ext cx="586080" cy="219960"/>
+            <a:off x="2868840" y="2269440"/>
+            <a:ext cx="854280" cy="320400"/>
           </a:xfrm>
           <a:prstGeom prst="rect">
             <a:avLst/>
@@ -38283,7 +38945,7 @@
           </a:bodyPr>
           <a:p>
             <a:r>
-              <a:rPr b="1" lang="ja-JP" sz="1150" strike="noStrike" u="none">
+              <a:rPr b="1" lang="ja-JP" sz="1679" strike="noStrike" u="none">
                 <a:solidFill>
                   <a:srgbClr val="fff8e1"/>
                 </a:solidFill>
@@ -38294,7 +38956,7 @@
               </a:rPr>
               <a:t>認証⽅式</a:t>
             </a:r>
-            <a:endParaRPr b="0" lang="en-US" sz="1150" strike="noStrike" u="none">
+            <a:endParaRPr b="0" lang="en-US" sz="1679" strike="noStrike" u="none">
               <a:solidFill>
                 <a:srgbClr val="000000"/>
               </a:solidFill>
@@ -38313,8 +38975,8 @@
         </p:nvSpPr>
         <p:spPr>
           <a:xfrm>
-            <a:off x="4329360" y="1559160"/>
-            <a:ext cx="293400" cy="219960"/>
+            <a:off x="5864760" y="2269440"/>
+            <a:ext cx="427320" cy="320400"/>
           </a:xfrm>
           <a:prstGeom prst="rect">
             <a:avLst/>
@@ -38330,7 +38992,7 @@
           </a:bodyPr>
           <a:p>
             <a:r>
-              <a:rPr b="1" lang="ja-JP" sz="1150" strike="noStrike" u="none">
+              <a:rPr b="1" lang="ja-JP" sz="1679" strike="noStrike" u="none">
                 <a:solidFill>
                   <a:srgbClr val="fff8e1"/>
                 </a:solidFill>
@@ -38341,7 +39003,7 @@
               </a:rPr>
               <a:t>特徴</a:t>
             </a:r>
-            <a:endParaRPr b="0" lang="en-US" sz="1150" strike="noStrike" u="none">
+            <a:endParaRPr b="0" lang="en-US" sz="1679" strike="noStrike" u="none">
               <a:solidFill>
                 <a:srgbClr val="000000"/>
               </a:solidFill>
@@ -38360,8 +39022,8 @@
         </p:nvSpPr>
         <p:spPr>
           <a:xfrm>
-            <a:off x="734760" y="1825560"/>
-            <a:ext cx="1918800" cy="219960"/>
+            <a:off x="761400" y="2650320"/>
+            <a:ext cx="2797200" cy="320400"/>
           </a:xfrm>
           <a:prstGeom prst="rect">
             <a:avLst/>
@@ -38377,7 +39039,7 @@
           </a:bodyPr>
           <a:p>
             <a:r>
-              <a:rPr b="1" lang="ja-JP" sz="1150" strike="noStrike" u="none">
+              <a:rPr b="1" lang="ja-JP" sz="1679" strike="noStrike" u="none">
                 <a:solidFill>
                   <a:srgbClr val="455a64"/>
                 </a:solidFill>
@@ -38389,7 +39051,7 @@
               <a:t>従来（</a:t>
             </a:r>
             <a:r>
-              <a:rPr b="1" lang="en-US" sz="1150" strike="noStrike" u="none">
+              <a:rPr b="1" lang="en-US" sz="1679" strike="noStrike" u="none">
                 <a:solidFill>
                   <a:srgbClr val="455a64"/>
                 </a:solidFill>
@@ -38401,7 +39063,7 @@
               <a:t>AD</a:t>
             </a:r>
             <a:r>
-              <a:rPr b="1" lang="ja-JP" sz="1150" strike="noStrike" u="none">
+              <a:rPr b="1" lang="ja-JP" sz="1679" strike="noStrike" u="none">
                 <a:solidFill>
                   <a:srgbClr val="455a64"/>
                 </a:solidFill>
@@ -38413,7 +39075,7 @@
               <a:t>環境）</a:t>
             </a:r>
             <a:r>
-              <a:rPr b="0" lang="en-US" sz="1150" strike="noStrike" u="none">
+              <a:rPr b="0" lang="en-US" sz="1679" strike="noStrike" u="none">
                 <a:solidFill>
                   <a:srgbClr val="455a64"/>
                 </a:solidFill>
@@ -38425,7 +39087,7 @@
               <a:t> </a:t>
             </a:r>
             <a:r>
-              <a:rPr b="0" lang="en-US" sz="1150" strike="noStrike" u="none">
+              <a:rPr b="0" lang="en-US" sz="1679" strike="noStrike" u="none">
                 <a:solidFill>
                   <a:srgbClr val="455a64"/>
                 </a:solidFill>
@@ -38436,7 +39098,7 @@
               </a:rPr>
               <a:t>Kerberos</a:t>
             </a:r>
-            <a:endParaRPr b="0" lang="en-US" sz="1150" strike="noStrike" u="none">
+            <a:endParaRPr b="0" lang="en-US" sz="1679" strike="noStrike" u="none">
               <a:solidFill>
                 <a:srgbClr val="000000"/>
               </a:solidFill>
@@ -38455,8 +39117,8 @@
         </p:nvSpPr>
         <p:spPr>
           <a:xfrm>
-            <a:off x="3139920" y="1825560"/>
-            <a:ext cx="2053080" cy="219960"/>
+            <a:off x="4175280" y="2650320"/>
+            <a:ext cx="2992680" cy="320400"/>
           </a:xfrm>
           <a:prstGeom prst="rect">
             <a:avLst/>
@@ -38472,7 +39134,7 @@
           </a:bodyPr>
           <a:p>
             <a:r>
-              <a:rPr b="0" lang="ja-JP" sz="1150" strike="noStrike" u="none">
+              <a:rPr b="0" lang="ja-JP" sz="1679" strike="noStrike" u="none">
                 <a:solidFill>
                   <a:srgbClr val="455a64"/>
                 </a:solidFill>
@@ -38484,7 +39146,7 @@
               <a:t>安全・スケーラブル・</a:t>
             </a:r>
             <a:r>
-              <a:rPr b="0" lang="en-US" sz="1150" strike="noStrike" u="none">
+              <a:rPr b="0" lang="en-US" sz="1679" strike="noStrike" u="none">
                 <a:solidFill>
                   <a:srgbClr val="455a64"/>
                 </a:solidFill>
@@ -38496,7 +39158,7 @@
               <a:t>AD</a:t>
             </a:r>
             <a:r>
-              <a:rPr b="0" lang="ja-JP" sz="1150" strike="noStrike" u="none">
+              <a:rPr b="0" lang="ja-JP" sz="1679" strike="noStrike" u="none">
                 <a:solidFill>
                   <a:srgbClr val="455a64"/>
                 </a:solidFill>
@@ -38507,7 +39169,7 @@
               </a:rPr>
               <a:t>必須</a:t>
             </a:r>
-            <a:endParaRPr b="0" lang="en-US" sz="1150" strike="noStrike" u="none">
+            <a:endParaRPr b="0" lang="en-US" sz="1679" strike="noStrike" u="none">
               <a:solidFill>
                 <a:srgbClr val="000000"/>
               </a:solidFill>
@@ -38526,8 +39188,8 @@
         </p:nvSpPr>
         <p:spPr>
           <a:xfrm>
-            <a:off x="734760" y="2092320"/>
-            <a:ext cx="1026720" cy="219960"/>
+            <a:off x="761400" y="3031560"/>
+            <a:ext cx="1496520" cy="320400"/>
           </a:xfrm>
           <a:prstGeom prst="rect">
             <a:avLst/>
@@ -38543,7 +39205,7 @@
           </a:bodyPr>
           <a:p>
             <a:r>
-              <a:rPr b="1" lang="en-US" sz="1150" strike="noStrike" u="none">
+              <a:rPr b="1" lang="en-US" sz="1679" strike="noStrike" u="none">
                 <a:solidFill>
                   <a:srgbClr val="455a64"/>
                 </a:solidFill>
@@ -38555,7 +39217,7 @@
               <a:t>2016</a:t>
             </a:r>
             <a:r>
-              <a:rPr b="1" lang="ja-JP" sz="1150" strike="noStrike" u="none">
+              <a:rPr b="1" lang="ja-JP" sz="1679" strike="noStrike" u="none">
                 <a:solidFill>
                   <a:srgbClr val="455a64"/>
                 </a:solidFill>
@@ -38567,7 +39229,7 @@
               <a:t>〜</a:t>
             </a:r>
             <a:r>
-              <a:rPr b="1" lang="en-US" sz="1150" strike="noStrike" u="none">
+              <a:rPr b="1" lang="en-US" sz="1679" strike="noStrike" u="none">
                 <a:solidFill>
                   <a:srgbClr val="455a64"/>
                 </a:solidFill>
@@ -38578,7 +39240,7 @@
               </a:rPr>
               <a:t>2022</a:t>
             </a:r>
-            <a:endParaRPr b="0" lang="en-US" sz="1150" strike="noStrike" u="none">
+            <a:endParaRPr b="0" lang="en-US" sz="1679" strike="noStrike" u="none">
               <a:solidFill>
                 <a:srgbClr val="000000"/>
               </a:solidFill>
@@ -38597,8 +39259,8 @@
         </p:nvSpPr>
         <p:spPr>
           <a:xfrm>
-            <a:off x="2061720" y="2092320"/>
-            <a:ext cx="405000" cy="219960"/>
+            <a:off x="2643480" y="3031560"/>
+            <a:ext cx="590400" cy="320400"/>
           </a:xfrm>
           <a:prstGeom prst="rect">
             <a:avLst/>
@@ -38614,7 +39276,7 @@
           </a:bodyPr>
           <a:p>
             <a:r>
-              <a:rPr b="0" lang="en-US" sz="1150" strike="noStrike" u="none">
+              <a:rPr b="0" lang="en-US" sz="1679" strike="noStrike" u="none">
                 <a:solidFill>
                   <a:srgbClr val="455a64"/>
                 </a:solidFill>
@@ -38625,7 +39287,7 @@
               </a:rPr>
               <a:t>NTLM</a:t>
             </a:r>
-            <a:endParaRPr b="0" lang="en-US" sz="1150" strike="noStrike" u="none">
+            <a:endParaRPr b="0" lang="en-US" sz="1679" strike="noStrike" u="none">
               <a:solidFill>
                 <a:srgbClr val="000000"/>
               </a:solidFill>
@@ -38644,8 +39306,8 @@
         </p:nvSpPr>
         <p:spPr>
           <a:xfrm>
-            <a:off x="3139920" y="2092320"/>
-            <a:ext cx="2487960" cy="219960"/>
+            <a:off x="4175280" y="3031560"/>
+            <a:ext cx="3627720" cy="320400"/>
           </a:xfrm>
           <a:prstGeom prst="rect">
             <a:avLst/>
@@ -38661,7 +39323,7 @@
           </a:bodyPr>
           <a:p>
             <a:r>
-              <a:rPr b="0" lang="ja-JP" sz="1150" strike="noStrike" u="none">
+              <a:rPr b="0" lang="ja-JP" sz="1679" strike="noStrike" u="none">
                 <a:solidFill>
                   <a:srgbClr val="455a64"/>
                 </a:solidFill>
@@ -38672,7 +39334,7 @@
               </a:rPr>
               <a:t>ドメイン不要・セキュリティ上の懸念</a:t>
             </a:r>
-            <a:endParaRPr b="0" lang="en-US" sz="1150" strike="noStrike" u="none">
+            <a:endParaRPr b="0" lang="en-US" sz="1679" strike="noStrike" u="none">
               <a:solidFill>
                 <a:srgbClr val="000000"/>
               </a:solidFill>
@@ -38691,8 +39353,8 @@
         </p:nvSpPr>
         <p:spPr>
           <a:xfrm>
-            <a:off x="734760" y="2359080"/>
-            <a:ext cx="586800" cy="219960"/>
+            <a:off x="761400" y="3412440"/>
+            <a:ext cx="855360" cy="320400"/>
           </a:xfrm>
           <a:prstGeom prst="rect">
             <a:avLst/>
@@ -38708,7 +39370,7 @@
           </a:bodyPr>
           <a:p>
             <a:r>
-              <a:rPr b="1" lang="en-US" sz="1150" strike="noStrike" u="none">
+              <a:rPr b="1" lang="en-US" sz="1679" strike="noStrike" u="none">
                 <a:solidFill>
                   <a:srgbClr val="455a64"/>
                 </a:solidFill>
@@ -38720,7 +39382,7 @@
               <a:t>2025</a:t>
             </a:r>
             <a:r>
-              <a:rPr b="1" lang="ja-JP" sz="1150" strike="noStrike" u="none">
+              <a:rPr b="1" lang="ja-JP" sz="1679" strike="noStrike" u="none">
                 <a:solidFill>
                   <a:srgbClr val="455a64"/>
                 </a:solidFill>
@@ -38731,7 +39393,7 @@
               </a:rPr>
               <a:t>〜</a:t>
             </a:r>
-            <a:endParaRPr b="0" lang="en-US" sz="1150" strike="noStrike" u="none">
+            <a:endParaRPr b="0" lang="en-US" sz="1679" strike="noStrike" u="none">
               <a:solidFill>
                 <a:srgbClr val="000000"/>
               </a:solidFill>
@@ -38750,8 +39412,8 @@
         </p:nvSpPr>
         <p:spPr>
           <a:xfrm>
-            <a:off x="2061720" y="2359080"/>
-            <a:ext cx="2688120" cy="219960"/>
+            <a:off x="2643480" y="3412440"/>
+            <a:ext cx="3918600" cy="320400"/>
           </a:xfrm>
           <a:prstGeom prst="rect">
             <a:avLst/>
@@ -38767,7 +39429,7 @@
           </a:bodyPr>
           <a:p>
             <a:r>
-              <a:rPr b="0" lang="ja-JP" sz="1150" strike="noStrike" u="none">
+              <a:rPr b="0" lang="ja-JP" sz="1679" strike="noStrike" u="none">
                 <a:solidFill>
                   <a:srgbClr val="455a64"/>
                 </a:solidFill>
@@ -38779,7 +39441,7 @@
               <a:t>証明書ベース 安全・</a:t>
             </a:r>
             <a:r>
-              <a:rPr b="0" lang="en-US" sz="1150" strike="noStrike" u="none">
+              <a:rPr b="0" lang="en-US" sz="1679" strike="noStrike" u="none">
                 <a:solidFill>
                   <a:srgbClr val="455a64"/>
                 </a:solidFill>
@@ -38791,7 +39453,7 @@
               <a:t>AD</a:t>
             </a:r>
             <a:r>
-              <a:rPr b="0" lang="ja-JP" sz="1150" strike="noStrike" u="none">
+              <a:rPr b="0" lang="ja-JP" sz="1679" strike="noStrike" u="none">
                 <a:solidFill>
                   <a:srgbClr val="455a64"/>
                 </a:solidFill>
@@ -38802,7 +39464,7 @@
               </a:rPr>
               <a:t>不要・相互認証</a:t>
             </a:r>
-            <a:endParaRPr b="0" lang="en-US" sz="1150" strike="noStrike" u="none">
+            <a:endParaRPr b="0" lang="en-US" sz="1679" strike="noStrike" u="none">
               <a:solidFill>
                 <a:srgbClr val="000000"/>
               </a:solidFill>
@@ -38821,8 +39483,8 @@
         </p:nvSpPr>
         <p:spPr>
           <a:xfrm>
-            <a:off x="847440" y="3323880"/>
-            <a:ext cx="66960" cy="67320"/>
+            <a:off x="790560" y="4819320"/>
+            <a:ext cx="95400" cy="95760"/>
           </a:xfrm>
           <a:custGeom>
             <a:avLst/>
@@ -38830,89 +39492,89 @@
             <a:ahLst/>
             <a:rect l="0" t="0" r="r" b="b"/>
             <a:pathLst>
-              <a:path w="186" h="187">
+              <a:path w="265" h="266">
                 <a:moveTo>
-                  <a:pt x="186" y="93"/>
+                  <a:pt x="265" y="133"/>
                 </a:moveTo>
                 <a:cubicBezTo>
-                  <a:pt x="186" y="105"/>
-                  <a:pt x="184" y="118"/>
-                  <a:pt x="179" y="129"/>
-                </a:cubicBezTo>
-                <a:cubicBezTo>
-                  <a:pt x="175" y="141"/>
-                  <a:pt x="168" y="151"/>
-                  <a:pt x="159" y="160"/>
-                </a:cubicBezTo>
-                <a:cubicBezTo>
-                  <a:pt x="151" y="168"/>
-                  <a:pt x="140" y="175"/>
-                  <a:pt x="128" y="180"/>
-                </a:cubicBezTo>
-                <a:cubicBezTo>
-                  <a:pt x="117" y="184"/>
-                  <a:pt x="105" y="187"/>
-                  <a:pt x="93" y="187"/>
-                </a:cubicBezTo>
-                <a:cubicBezTo>
-                  <a:pt x="81" y="187"/>
-                  <a:pt x="69" y="184"/>
-                  <a:pt x="57" y="180"/>
-                </a:cubicBezTo>
-                <a:cubicBezTo>
-                  <a:pt x="46" y="175"/>
-                  <a:pt x="36" y="168"/>
-                  <a:pt x="27" y="160"/>
-                </a:cubicBezTo>
-                <a:cubicBezTo>
-                  <a:pt x="19" y="151"/>
-                  <a:pt x="12" y="141"/>
-                  <a:pt x="7" y="129"/>
-                </a:cubicBezTo>
-                <a:cubicBezTo>
-                  <a:pt x="3" y="118"/>
-                  <a:pt x="0" y="105"/>
-                  <a:pt x="0" y="93"/>
-                </a:cubicBezTo>
-                <a:cubicBezTo>
-                  <a:pt x="0" y="81"/>
-                  <a:pt x="3" y="69"/>
-                  <a:pt x="7" y="58"/>
-                </a:cubicBezTo>
-                <a:cubicBezTo>
-                  <a:pt x="12" y="46"/>
-                  <a:pt x="19" y="36"/>
-                  <a:pt x="27" y="28"/>
-                </a:cubicBezTo>
-                <a:cubicBezTo>
-                  <a:pt x="36" y="19"/>
-                  <a:pt x="46" y="12"/>
-                  <a:pt x="57" y="8"/>
-                </a:cubicBezTo>
-                <a:cubicBezTo>
-                  <a:pt x="69" y="3"/>
-                  <a:pt x="81" y="0"/>
-                  <a:pt x="93" y="0"/>
-                </a:cubicBezTo>
-                <a:cubicBezTo>
-                  <a:pt x="105" y="0"/>
-                  <a:pt x="117" y="3"/>
-                  <a:pt x="128" y="8"/>
-                </a:cubicBezTo>
-                <a:cubicBezTo>
-                  <a:pt x="140" y="12"/>
-                  <a:pt x="151" y="19"/>
-                  <a:pt x="159" y="28"/>
-                </a:cubicBezTo>
-                <a:cubicBezTo>
-                  <a:pt x="168" y="36"/>
-                  <a:pt x="175" y="46"/>
-                  <a:pt x="179" y="58"/>
-                </a:cubicBezTo>
-                <a:cubicBezTo>
-                  <a:pt x="184" y="69"/>
-                  <a:pt x="186" y="81"/>
-                  <a:pt x="186" y="93"/>
+                  <a:pt x="265" y="150"/>
+                  <a:pt x="262" y="167"/>
+                  <a:pt x="255" y="183"/>
+                </a:cubicBezTo>
+                <a:cubicBezTo>
+                  <a:pt x="248" y="200"/>
+                  <a:pt x="239" y="215"/>
+                  <a:pt x="226" y="227"/>
+                </a:cubicBezTo>
+                <a:cubicBezTo>
+                  <a:pt x="214" y="240"/>
+                  <a:pt x="200" y="249"/>
+                  <a:pt x="183" y="256"/>
+                </a:cubicBezTo>
+                <a:cubicBezTo>
+                  <a:pt x="167" y="263"/>
+                  <a:pt x="150" y="266"/>
+                  <a:pt x="133" y="266"/>
+                </a:cubicBezTo>
+                <a:cubicBezTo>
+                  <a:pt x="115" y="266"/>
+                  <a:pt x="98" y="263"/>
+                  <a:pt x="82" y="256"/>
+                </a:cubicBezTo>
+                <a:cubicBezTo>
+                  <a:pt x="66" y="249"/>
+                  <a:pt x="52" y="240"/>
+                  <a:pt x="38" y="227"/>
+                </a:cubicBezTo>
+                <a:cubicBezTo>
+                  <a:pt x="26" y="215"/>
+                  <a:pt x="16" y="200"/>
+                  <a:pt x="10" y="183"/>
+                </a:cubicBezTo>
+                <a:cubicBezTo>
+                  <a:pt x="3" y="167"/>
+                  <a:pt x="0" y="150"/>
+                  <a:pt x="0" y="133"/>
+                </a:cubicBezTo>
+                <a:cubicBezTo>
+                  <a:pt x="0" y="115"/>
+                  <a:pt x="3" y="98"/>
+                  <a:pt x="10" y="82"/>
+                </a:cubicBezTo>
+                <a:cubicBezTo>
+                  <a:pt x="16" y="66"/>
+                  <a:pt x="26" y="52"/>
+                  <a:pt x="38" y="39"/>
+                </a:cubicBezTo>
+                <a:cubicBezTo>
+                  <a:pt x="52" y="27"/>
+                  <a:pt x="66" y="17"/>
+                  <a:pt x="82" y="10"/>
+                </a:cubicBezTo>
+                <a:cubicBezTo>
+                  <a:pt x="98" y="4"/>
+                  <a:pt x="115" y="0"/>
+                  <a:pt x="133" y="0"/>
+                </a:cubicBezTo>
+                <a:cubicBezTo>
+                  <a:pt x="150" y="0"/>
+                  <a:pt x="167" y="4"/>
+                  <a:pt x="183" y="10"/>
+                </a:cubicBezTo>
+                <a:cubicBezTo>
+                  <a:pt x="200" y="17"/>
+                  <a:pt x="214" y="27"/>
+                  <a:pt x="226" y="39"/>
+                </a:cubicBezTo>
+                <a:cubicBezTo>
+                  <a:pt x="239" y="52"/>
+                  <a:pt x="248" y="66"/>
+                  <a:pt x="255" y="82"/>
+                </a:cubicBezTo>
+                <a:cubicBezTo>
+                  <a:pt x="262" y="98"/>
+                  <a:pt x="265" y="115"/>
+                  <a:pt x="265" y="133"/>
                 </a:cubicBezTo>
                 <a:close/>
               </a:path>
@@ -38949,8 +39611,8 @@
         </p:nvSpPr>
         <p:spPr>
           <a:xfrm>
-            <a:off x="666720" y="2708280"/>
-            <a:ext cx="2762280" cy="344880"/>
+            <a:off x="666720" y="3902400"/>
+            <a:ext cx="4024080" cy="503280"/>
           </a:xfrm>
           <a:prstGeom prst="rect">
             <a:avLst/>
@@ -38966,7 +39628,7 @@
           </a:bodyPr>
           <a:p>
             <a:r>
-              <a:rPr b="1" lang="ja-JP" sz="1810" strike="noStrike" u="none">
+              <a:rPr b="1" lang="ja-JP" sz="2640" strike="noStrike" u="none">
                 <a:solidFill>
                   <a:srgbClr val="455a64"/>
                 </a:solidFill>
@@ -38977,7 +39639,7 @@
               </a:rPr>
               <a:t>証明書ベース認証の仕組み</a:t>
             </a:r>
-            <a:endParaRPr b="0" lang="en-US" sz="1810" strike="noStrike" u="none">
+            <a:endParaRPr b="0" lang="en-US" sz="2640" strike="noStrike" u="none">
               <a:solidFill>
                 <a:srgbClr val="000000"/>
               </a:solidFill>
@@ -38996,8 +39658,8 @@
         </p:nvSpPr>
         <p:spPr>
           <a:xfrm>
-            <a:off x="847440" y="3628800"/>
-            <a:ext cx="66960" cy="66960"/>
+            <a:off x="790560" y="5267160"/>
+            <a:ext cx="95400" cy="95760"/>
           </a:xfrm>
           <a:custGeom>
             <a:avLst/>
@@ -39005,89 +39667,89 @@
             <a:ahLst/>
             <a:rect l="0" t="0" r="r" b="b"/>
             <a:pathLst>
-              <a:path w="186" h="186">
+              <a:path w="265" h="266">
                 <a:moveTo>
-                  <a:pt x="186" y="94"/>
+                  <a:pt x="265" y="133"/>
                 </a:moveTo>
                 <a:cubicBezTo>
-                  <a:pt x="186" y="106"/>
-                  <a:pt x="184" y="118"/>
-                  <a:pt x="179" y="129"/>
-                </a:cubicBezTo>
-                <a:cubicBezTo>
-                  <a:pt x="175" y="141"/>
-                  <a:pt x="168" y="151"/>
-                  <a:pt x="159" y="159"/>
-                </a:cubicBezTo>
-                <a:cubicBezTo>
-                  <a:pt x="151" y="168"/>
-                  <a:pt x="140" y="175"/>
-                  <a:pt x="128" y="179"/>
-                </a:cubicBezTo>
-                <a:cubicBezTo>
-                  <a:pt x="117" y="184"/>
-                  <a:pt x="105" y="186"/>
-                  <a:pt x="93" y="186"/>
-                </a:cubicBezTo>
-                <a:cubicBezTo>
-                  <a:pt x="81" y="186"/>
-                  <a:pt x="69" y="184"/>
-                  <a:pt x="57" y="179"/>
-                </a:cubicBezTo>
-                <a:cubicBezTo>
-                  <a:pt x="46" y="175"/>
-                  <a:pt x="36" y="168"/>
-                  <a:pt x="27" y="159"/>
-                </a:cubicBezTo>
-                <a:cubicBezTo>
-                  <a:pt x="19" y="151"/>
-                  <a:pt x="12" y="141"/>
-                  <a:pt x="7" y="129"/>
-                </a:cubicBezTo>
-                <a:cubicBezTo>
-                  <a:pt x="3" y="118"/>
-                  <a:pt x="0" y="106"/>
-                  <a:pt x="0" y="94"/>
-                </a:cubicBezTo>
-                <a:cubicBezTo>
-                  <a:pt x="0" y="81"/>
-                  <a:pt x="3" y="70"/>
-                  <a:pt x="7" y="58"/>
-                </a:cubicBezTo>
-                <a:cubicBezTo>
-                  <a:pt x="12" y="47"/>
-                  <a:pt x="19" y="37"/>
-                  <a:pt x="27" y="28"/>
-                </a:cubicBezTo>
-                <a:cubicBezTo>
-                  <a:pt x="36" y="20"/>
-                  <a:pt x="46" y="13"/>
-                  <a:pt x="57" y="8"/>
-                </a:cubicBezTo>
-                <a:cubicBezTo>
-                  <a:pt x="69" y="2"/>
-                  <a:pt x="81" y="0"/>
-                  <a:pt x="93" y="0"/>
-                </a:cubicBezTo>
-                <a:cubicBezTo>
-                  <a:pt x="105" y="0"/>
-                  <a:pt x="117" y="2"/>
-                  <a:pt x="128" y="8"/>
-                </a:cubicBezTo>
-                <a:cubicBezTo>
-                  <a:pt x="140" y="13"/>
-                  <a:pt x="151" y="20"/>
-                  <a:pt x="159" y="28"/>
-                </a:cubicBezTo>
-                <a:cubicBezTo>
-                  <a:pt x="168" y="37"/>
-                  <a:pt x="175" y="47"/>
-                  <a:pt x="179" y="58"/>
-                </a:cubicBezTo>
-                <a:cubicBezTo>
-                  <a:pt x="184" y="70"/>
-                  <a:pt x="186" y="81"/>
-                  <a:pt x="186" y="94"/>
+                  <a:pt x="265" y="151"/>
+                  <a:pt x="262" y="168"/>
+                  <a:pt x="255" y="184"/>
+                </a:cubicBezTo>
+                <a:cubicBezTo>
+                  <a:pt x="248" y="200"/>
+                  <a:pt x="239" y="214"/>
+                  <a:pt x="226" y="227"/>
+                </a:cubicBezTo>
+                <a:cubicBezTo>
+                  <a:pt x="214" y="239"/>
+                  <a:pt x="200" y="249"/>
+                  <a:pt x="183" y="255"/>
+                </a:cubicBezTo>
+                <a:cubicBezTo>
+                  <a:pt x="167" y="262"/>
+                  <a:pt x="150" y="266"/>
+                  <a:pt x="133" y="266"/>
+                </a:cubicBezTo>
+                <a:cubicBezTo>
+                  <a:pt x="115" y="266"/>
+                  <a:pt x="98" y="262"/>
+                  <a:pt x="82" y="255"/>
+                </a:cubicBezTo>
+                <a:cubicBezTo>
+                  <a:pt x="66" y="249"/>
+                  <a:pt x="52" y="239"/>
+                  <a:pt x="38" y="227"/>
+                </a:cubicBezTo>
+                <a:cubicBezTo>
+                  <a:pt x="26" y="214"/>
+                  <a:pt x="16" y="200"/>
+                  <a:pt x="10" y="184"/>
+                </a:cubicBezTo>
+                <a:cubicBezTo>
+                  <a:pt x="3" y="168"/>
+                  <a:pt x="0" y="151"/>
+                  <a:pt x="0" y="133"/>
+                </a:cubicBezTo>
+                <a:cubicBezTo>
+                  <a:pt x="0" y="116"/>
+                  <a:pt x="3" y="99"/>
+                  <a:pt x="10" y="83"/>
+                </a:cubicBezTo>
+                <a:cubicBezTo>
+                  <a:pt x="16" y="66"/>
+                  <a:pt x="26" y="52"/>
+                  <a:pt x="38" y="40"/>
+                </a:cubicBezTo>
+                <a:cubicBezTo>
+                  <a:pt x="52" y="27"/>
+                  <a:pt x="66" y="17"/>
+                  <a:pt x="82" y="10"/>
+                </a:cubicBezTo>
+                <a:cubicBezTo>
+                  <a:pt x="98" y="3"/>
+                  <a:pt x="115" y="0"/>
+                  <a:pt x="133" y="0"/>
+                </a:cubicBezTo>
+                <a:cubicBezTo>
+                  <a:pt x="150" y="0"/>
+                  <a:pt x="167" y="3"/>
+                  <a:pt x="183" y="10"/>
+                </a:cubicBezTo>
+                <a:cubicBezTo>
+                  <a:pt x="200" y="17"/>
+                  <a:pt x="214" y="27"/>
+                  <a:pt x="226" y="40"/>
+                </a:cubicBezTo>
+                <a:cubicBezTo>
+                  <a:pt x="239" y="52"/>
+                  <a:pt x="248" y="66"/>
+                  <a:pt x="255" y="83"/>
+                </a:cubicBezTo>
+                <a:cubicBezTo>
+                  <a:pt x="262" y="99"/>
+                  <a:pt x="265" y="116"/>
+                  <a:pt x="265" y="133"/>
                 </a:cubicBezTo>
                 <a:close/>
               </a:path>
@@ -39124,8 +39786,8 @@
         </p:nvSpPr>
         <p:spPr>
           <a:xfrm>
-            <a:off x="1047600" y="3233520"/>
-            <a:ext cx="3449880" cy="276120"/>
+            <a:off x="1047600" y="4671720"/>
+            <a:ext cx="5131800" cy="411840"/>
           </a:xfrm>
           <a:prstGeom prst="rect">
             <a:avLst/>
@@ -39141,7 +39803,7 @@
           </a:bodyPr>
           <a:p>
             <a:r>
-              <a:rPr b="0" lang="ja-JP" sz="1450" strike="noStrike" u="none">
+              <a:rPr b="0" lang="ja-JP" sz="2160" strike="noStrike" u="none">
                 <a:solidFill>
                   <a:srgbClr val="455a64"/>
                 </a:solidFill>
@@ -39153,7 +39815,7 @@
               <a:t>各ノードに</a:t>
             </a:r>
             <a:r>
-              <a:rPr b="1" lang="en-US" sz="1450" strike="noStrike" u="none">
+              <a:rPr b="1" lang="en-US" sz="2160" strike="noStrike" u="none">
                 <a:solidFill>
                   <a:srgbClr val="455a64"/>
                 </a:solidFill>
@@ -39165,7 +39827,7 @@
               <a:t>X.509</a:t>
             </a:r>
             <a:r>
-              <a:rPr b="1" lang="ja-JP" sz="1450" strike="noStrike" u="none">
+              <a:rPr b="1" lang="ja-JP" sz="2160" strike="noStrike" u="none">
                 <a:solidFill>
                   <a:srgbClr val="455a64"/>
                 </a:solidFill>
@@ -39177,7 +39839,7 @@
               <a:t>証明書</a:t>
             </a:r>
             <a:r>
-              <a:rPr b="0" lang="ja-JP" sz="1450" strike="noStrike" u="none">
+              <a:rPr b="0" lang="ja-JP" sz="2160" strike="noStrike" u="none">
                 <a:solidFill>
                   <a:srgbClr val="455a64"/>
                 </a:solidFill>
@@ -39188,7 +39850,7 @@
               </a:rPr>
               <a:t>をインストール</a:t>
             </a:r>
-            <a:endParaRPr b="0" lang="en-US" sz="1450" strike="noStrike" u="none">
+            <a:endParaRPr b="0" lang="en-US" sz="2160" strike="noStrike" u="none">
               <a:solidFill>
                 <a:srgbClr val="000000"/>
               </a:solidFill>
@@ -39207,8 +39869,8 @@
         </p:nvSpPr>
         <p:spPr>
           <a:xfrm>
-            <a:off x="847440" y="3933720"/>
-            <a:ext cx="66960" cy="66960"/>
+            <a:off x="790560" y="5724360"/>
+            <a:ext cx="95400" cy="95760"/>
           </a:xfrm>
           <a:custGeom>
             <a:avLst/>
@@ -39216,89 +39878,89 @@
             <a:ahLst/>
             <a:rect l="0" t="0" r="r" b="b"/>
             <a:pathLst>
-              <a:path w="186" h="186">
+              <a:path w="265" h="266">
                 <a:moveTo>
-                  <a:pt x="186" y="93"/>
+                  <a:pt x="265" y="133"/>
                 </a:moveTo>
                 <a:cubicBezTo>
-                  <a:pt x="186" y="106"/>
-                  <a:pt x="184" y="117"/>
-                  <a:pt x="179" y="129"/>
-                </a:cubicBezTo>
-                <a:cubicBezTo>
-                  <a:pt x="175" y="140"/>
-                  <a:pt x="168" y="150"/>
-                  <a:pt x="159" y="159"/>
-                </a:cubicBezTo>
-                <a:cubicBezTo>
-                  <a:pt x="151" y="168"/>
-                  <a:pt x="140" y="174"/>
-                  <a:pt x="128" y="179"/>
-                </a:cubicBezTo>
-                <a:cubicBezTo>
-                  <a:pt x="117" y="184"/>
-                  <a:pt x="105" y="186"/>
-                  <a:pt x="93" y="186"/>
-                </a:cubicBezTo>
-                <a:cubicBezTo>
-                  <a:pt x="81" y="186"/>
-                  <a:pt x="69" y="184"/>
-                  <a:pt x="57" y="179"/>
-                </a:cubicBezTo>
-                <a:cubicBezTo>
-                  <a:pt x="46" y="174"/>
-                  <a:pt x="36" y="168"/>
-                  <a:pt x="27" y="159"/>
-                </a:cubicBezTo>
-                <a:cubicBezTo>
-                  <a:pt x="19" y="150"/>
-                  <a:pt x="12" y="140"/>
-                  <a:pt x="7" y="129"/>
-                </a:cubicBezTo>
-                <a:cubicBezTo>
-                  <a:pt x="3" y="117"/>
-                  <a:pt x="0" y="106"/>
-                  <a:pt x="0" y="93"/>
-                </a:cubicBezTo>
-                <a:cubicBezTo>
-                  <a:pt x="0" y="80"/>
-                  <a:pt x="3" y="68"/>
-                  <a:pt x="7" y="57"/>
-                </a:cubicBezTo>
-                <a:cubicBezTo>
-                  <a:pt x="12" y="46"/>
-                  <a:pt x="19" y="36"/>
-                  <a:pt x="27" y="27"/>
-                </a:cubicBezTo>
-                <a:cubicBezTo>
-                  <a:pt x="36" y="18"/>
-                  <a:pt x="46" y="12"/>
-                  <a:pt x="57" y="7"/>
-                </a:cubicBezTo>
-                <a:cubicBezTo>
-                  <a:pt x="69" y="2"/>
-                  <a:pt x="81" y="0"/>
-                  <a:pt x="93" y="0"/>
-                </a:cubicBezTo>
-                <a:cubicBezTo>
-                  <a:pt x="105" y="0"/>
-                  <a:pt x="117" y="2"/>
-                  <a:pt x="128" y="7"/>
-                </a:cubicBezTo>
-                <a:cubicBezTo>
-                  <a:pt x="140" y="12"/>
-                  <a:pt x="151" y="18"/>
-                  <a:pt x="159" y="27"/>
-                </a:cubicBezTo>
-                <a:cubicBezTo>
-                  <a:pt x="168" y="36"/>
-                  <a:pt x="175" y="46"/>
-                  <a:pt x="179" y="57"/>
-                </a:cubicBezTo>
-                <a:cubicBezTo>
-                  <a:pt x="184" y="68"/>
-                  <a:pt x="186" y="80"/>
-                  <a:pt x="186" y="93"/>
+                  <a:pt x="265" y="151"/>
+                  <a:pt x="262" y="168"/>
+                  <a:pt x="255" y="184"/>
+                </a:cubicBezTo>
+                <a:cubicBezTo>
+                  <a:pt x="248" y="200"/>
+                  <a:pt x="239" y="214"/>
+                  <a:pt x="226" y="227"/>
+                </a:cubicBezTo>
+                <a:cubicBezTo>
+                  <a:pt x="214" y="239"/>
+                  <a:pt x="200" y="249"/>
+                  <a:pt x="183" y="255"/>
+                </a:cubicBezTo>
+                <a:cubicBezTo>
+                  <a:pt x="167" y="262"/>
+                  <a:pt x="150" y="266"/>
+                  <a:pt x="133" y="266"/>
+                </a:cubicBezTo>
+                <a:cubicBezTo>
+                  <a:pt x="115" y="266"/>
+                  <a:pt x="98" y="262"/>
+                  <a:pt x="82" y="255"/>
+                </a:cubicBezTo>
+                <a:cubicBezTo>
+                  <a:pt x="66" y="249"/>
+                  <a:pt x="52" y="239"/>
+                  <a:pt x="38" y="227"/>
+                </a:cubicBezTo>
+                <a:cubicBezTo>
+                  <a:pt x="26" y="214"/>
+                  <a:pt x="16" y="200"/>
+                  <a:pt x="10" y="184"/>
+                </a:cubicBezTo>
+                <a:cubicBezTo>
+                  <a:pt x="3" y="168"/>
+                  <a:pt x="0" y="151"/>
+                  <a:pt x="0" y="133"/>
+                </a:cubicBezTo>
+                <a:cubicBezTo>
+                  <a:pt x="0" y="116"/>
+                  <a:pt x="3" y="99"/>
+                  <a:pt x="10" y="83"/>
+                </a:cubicBezTo>
+                <a:cubicBezTo>
+                  <a:pt x="16" y="65"/>
+                  <a:pt x="26" y="51"/>
+                  <a:pt x="38" y="39"/>
+                </a:cubicBezTo>
+                <a:cubicBezTo>
+                  <a:pt x="52" y="26"/>
+                  <a:pt x="66" y="17"/>
+                  <a:pt x="82" y="10"/>
+                </a:cubicBezTo>
+                <a:cubicBezTo>
+                  <a:pt x="98" y="3"/>
+                  <a:pt x="115" y="0"/>
+                  <a:pt x="133" y="0"/>
+                </a:cubicBezTo>
+                <a:cubicBezTo>
+                  <a:pt x="150" y="0"/>
+                  <a:pt x="167" y="3"/>
+                  <a:pt x="183" y="10"/>
+                </a:cubicBezTo>
+                <a:cubicBezTo>
+                  <a:pt x="200" y="17"/>
+                  <a:pt x="214" y="26"/>
+                  <a:pt x="226" y="39"/>
+                </a:cubicBezTo>
+                <a:cubicBezTo>
+                  <a:pt x="239" y="51"/>
+                  <a:pt x="248" y="65"/>
+                  <a:pt x="255" y="83"/>
+                </a:cubicBezTo>
+                <a:cubicBezTo>
+                  <a:pt x="262" y="99"/>
+                  <a:pt x="265" y="116"/>
+                  <a:pt x="265" y="133"/>
                 </a:cubicBezTo>
                 <a:close/>
               </a:path>
@@ -39335,8 +39997,8 @@
         </p:nvSpPr>
         <p:spPr>
           <a:xfrm>
-            <a:off x="1047600" y="3538440"/>
-            <a:ext cx="2582280" cy="276120"/>
+            <a:off x="1047600" y="5119560"/>
+            <a:ext cx="3841200" cy="411840"/>
           </a:xfrm>
           <a:prstGeom prst="rect">
             <a:avLst/>
@@ -39352,7 +40014,7 @@
           </a:bodyPr>
           <a:p>
             <a:r>
-              <a:rPr b="0" lang="ja-JP" sz="1450" strike="noStrike" u="none">
+              <a:rPr b="0" lang="ja-JP" sz="2160" strike="noStrike" u="none">
                 <a:solidFill>
                   <a:srgbClr val="455a64"/>
                 </a:solidFill>
@@ -39363,7 +40025,7 @@
               </a:rPr>
               <a:t>相互に証明書を信頼させる設定</a:t>
             </a:r>
-            <a:endParaRPr b="0" lang="en-US" sz="1450" strike="noStrike" u="none">
+            <a:endParaRPr b="0" lang="en-US" sz="2160" strike="noStrike" u="none">
               <a:solidFill>
                 <a:srgbClr val="000000"/>
               </a:solidFill>
@@ -39382,8 +40044,8 @@
         </p:nvSpPr>
         <p:spPr>
           <a:xfrm>
-            <a:off x="847440" y="4238280"/>
-            <a:ext cx="66960" cy="67320"/>
+            <a:off x="790560" y="6171840"/>
+            <a:ext cx="95400" cy="95760"/>
           </a:xfrm>
           <a:custGeom>
             <a:avLst/>
@@ -39391,89 +40053,89 @@
             <a:ahLst/>
             <a:rect l="0" t="0" r="r" b="b"/>
             <a:pathLst>
-              <a:path w="186" h="187">
+              <a:path w="265" h="266">
                 <a:moveTo>
-                  <a:pt x="186" y="93"/>
+                  <a:pt x="265" y="133"/>
                 </a:moveTo>
                 <a:cubicBezTo>
-                  <a:pt x="186" y="105"/>
-                  <a:pt x="184" y="117"/>
-                  <a:pt x="179" y="128"/>
-                </a:cubicBezTo>
-                <a:cubicBezTo>
-                  <a:pt x="175" y="140"/>
-                  <a:pt x="168" y="150"/>
-                  <a:pt x="159" y="159"/>
-                </a:cubicBezTo>
-                <a:cubicBezTo>
-                  <a:pt x="151" y="168"/>
-                  <a:pt x="140" y="175"/>
-                  <a:pt x="128" y="180"/>
-                </a:cubicBezTo>
-                <a:cubicBezTo>
-                  <a:pt x="117" y="184"/>
-                  <a:pt x="105" y="187"/>
-                  <a:pt x="93" y="187"/>
-                </a:cubicBezTo>
-                <a:cubicBezTo>
-                  <a:pt x="81" y="187"/>
-                  <a:pt x="69" y="184"/>
-                  <a:pt x="57" y="180"/>
-                </a:cubicBezTo>
-                <a:cubicBezTo>
-                  <a:pt x="46" y="175"/>
-                  <a:pt x="36" y="168"/>
-                  <a:pt x="27" y="159"/>
-                </a:cubicBezTo>
-                <a:cubicBezTo>
-                  <a:pt x="19" y="150"/>
-                  <a:pt x="12" y="140"/>
-                  <a:pt x="7" y="128"/>
-                </a:cubicBezTo>
-                <a:cubicBezTo>
-                  <a:pt x="3" y="117"/>
-                  <a:pt x="0" y="105"/>
-                  <a:pt x="0" y="93"/>
-                </a:cubicBezTo>
-                <a:cubicBezTo>
-                  <a:pt x="0" y="81"/>
-                  <a:pt x="3" y="69"/>
-                  <a:pt x="7" y="58"/>
-                </a:cubicBezTo>
-                <a:cubicBezTo>
-                  <a:pt x="12" y="46"/>
-                  <a:pt x="19" y="36"/>
-                  <a:pt x="27" y="28"/>
-                </a:cubicBezTo>
-                <a:cubicBezTo>
-                  <a:pt x="36" y="19"/>
-                  <a:pt x="46" y="12"/>
-                  <a:pt x="57" y="8"/>
-                </a:cubicBezTo>
-                <a:cubicBezTo>
-                  <a:pt x="69" y="3"/>
-                  <a:pt x="81" y="0"/>
-                  <a:pt x="93" y="0"/>
-                </a:cubicBezTo>
-                <a:cubicBezTo>
-                  <a:pt x="105" y="0"/>
-                  <a:pt x="117" y="3"/>
-                  <a:pt x="128" y="8"/>
-                </a:cubicBezTo>
-                <a:cubicBezTo>
-                  <a:pt x="140" y="12"/>
-                  <a:pt x="151" y="19"/>
-                  <a:pt x="159" y="28"/>
-                </a:cubicBezTo>
-                <a:cubicBezTo>
-                  <a:pt x="168" y="36"/>
-                  <a:pt x="175" y="46"/>
-                  <a:pt x="179" y="58"/>
-                </a:cubicBezTo>
-                <a:cubicBezTo>
-                  <a:pt x="184" y="69"/>
-                  <a:pt x="186" y="81"/>
-                  <a:pt x="186" y="93"/>
+                  <a:pt x="265" y="151"/>
+                  <a:pt x="262" y="168"/>
+                  <a:pt x="255" y="184"/>
+                </a:cubicBezTo>
+                <a:cubicBezTo>
+                  <a:pt x="248" y="201"/>
+                  <a:pt x="239" y="215"/>
+                  <a:pt x="226" y="227"/>
+                </a:cubicBezTo>
+                <a:cubicBezTo>
+                  <a:pt x="214" y="240"/>
+                  <a:pt x="200" y="249"/>
+                  <a:pt x="183" y="256"/>
+                </a:cubicBezTo>
+                <a:cubicBezTo>
+                  <a:pt x="167" y="263"/>
+                  <a:pt x="150" y="266"/>
+                  <a:pt x="133" y="266"/>
+                </a:cubicBezTo>
+                <a:cubicBezTo>
+                  <a:pt x="115" y="266"/>
+                  <a:pt x="98" y="263"/>
+                  <a:pt x="82" y="256"/>
+                </a:cubicBezTo>
+                <a:cubicBezTo>
+                  <a:pt x="66" y="249"/>
+                  <a:pt x="52" y="240"/>
+                  <a:pt x="38" y="227"/>
+                </a:cubicBezTo>
+                <a:cubicBezTo>
+                  <a:pt x="26" y="215"/>
+                  <a:pt x="16" y="201"/>
+                  <a:pt x="10" y="184"/>
+                </a:cubicBezTo>
+                <a:cubicBezTo>
+                  <a:pt x="3" y="168"/>
+                  <a:pt x="0" y="151"/>
+                  <a:pt x="0" y="133"/>
+                </a:cubicBezTo>
+                <a:cubicBezTo>
+                  <a:pt x="0" y="115"/>
+                  <a:pt x="3" y="98"/>
+                  <a:pt x="10" y="82"/>
+                </a:cubicBezTo>
+                <a:cubicBezTo>
+                  <a:pt x="16" y="66"/>
+                  <a:pt x="26" y="52"/>
+                  <a:pt x="38" y="39"/>
+                </a:cubicBezTo>
+                <a:cubicBezTo>
+                  <a:pt x="52" y="27"/>
+                  <a:pt x="66" y="17"/>
+                  <a:pt x="82" y="11"/>
+                </a:cubicBezTo>
+                <a:cubicBezTo>
+                  <a:pt x="98" y="4"/>
+                  <a:pt x="115" y="0"/>
+                  <a:pt x="133" y="0"/>
+                </a:cubicBezTo>
+                <a:cubicBezTo>
+                  <a:pt x="150" y="0"/>
+                  <a:pt x="167" y="4"/>
+                  <a:pt x="183" y="11"/>
+                </a:cubicBezTo>
+                <a:cubicBezTo>
+                  <a:pt x="200" y="17"/>
+                  <a:pt x="214" y="27"/>
+                  <a:pt x="226" y="39"/>
+                </a:cubicBezTo>
+                <a:cubicBezTo>
+                  <a:pt x="239" y="52"/>
+                  <a:pt x="248" y="66"/>
+                  <a:pt x="255" y="82"/>
+                </a:cubicBezTo>
+                <a:cubicBezTo>
+                  <a:pt x="262" y="98"/>
+                  <a:pt x="265" y="115"/>
+                  <a:pt x="265" y="133"/>
                 </a:cubicBezTo>
                 <a:close/>
               </a:path>
@@ -39510,8 +40172,8 @@
         </p:nvSpPr>
         <p:spPr>
           <a:xfrm>
-            <a:off x="1047600" y="3843000"/>
-            <a:ext cx="2974320" cy="276120"/>
+            <a:off x="1047600" y="5576760"/>
+            <a:ext cx="4424400" cy="411840"/>
           </a:xfrm>
           <a:prstGeom prst="rect">
             <a:avLst/>
@@ -39527,7 +40189,7 @@
           </a:bodyPr>
           <a:p>
             <a:r>
-              <a:rPr b="0" lang="en-US" sz="1450" strike="noStrike" u="none">
+              <a:rPr b="0" lang="en-US" sz="2160" strike="noStrike" u="none">
                 <a:solidFill>
                   <a:srgbClr val="455a64"/>
                 </a:solidFill>
@@ -39539,7 +40201,7 @@
               <a:t>TLS</a:t>
             </a:r>
             <a:r>
-              <a:rPr b="0" lang="ja-JP" sz="1450" strike="noStrike" u="none">
+              <a:rPr b="0" lang="ja-JP" sz="2160" strike="noStrike" u="none">
                 <a:solidFill>
                   <a:srgbClr val="455a64"/>
                 </a:solidFill>
@@ -39550,7 +40212,7 @@
               </a:rPr>
               <a:t>相互認証でノード間通信を保護</a:t>
             </a:r>
-            <a:endParaRPr b="0" lang="en-US" sz="1450" strike="noStrike" u="none">
+            <a:endParaRPr b="0" lang="en-US" sz="2160" strike="noStrike" u="none">
               <a:solidFill>
                 <a:srgbClr val="000000"/>
               </a:solidFill>
@@ -39569,8 +40231,8 @@
         </p:nvSpPr>
         <p:spPr>
           <a:xfrm>
-            <a:off x="1047600" y="4147920"/>
-            <a:ext cx="3679200" cy="276120"/>
+            <a:off x="1047600" y="6024240"/>
+            <a:ext cx="5473080" cy="411840"/>
           </a:xfrm>
           <a:prstGeom prst="rect">
             <a:avLst/>
@@ -39586,7 +40248,7 @@
           </a:bodyPr>
           <a:p>
             <a:r>
-              <a:rPr b="0" lang="ja-JP" sz="1450" strike="noStrike" u="none">
+              <a:rPr b="0" lang="ja-JP" sz="2160" strike="noStrike" u="none">
                 <a:solidFill>
                   <a:srgbClr val="455a64"/>
                 </a:solidFill>
@@ -39598,7 +40260,7 @@
               <a:t>⾃⼰署名証明書または</a:t>
             </a:r>
             <a:r>
-              <a:rPr b="0" lang="en-US" sz="1450" strike="noStrike" u="none">
+              <a:rPr b="0" lang="en-US" sz="2160" strike="noStrike" u="none">
                 <a:solidFill>
                   <a:srgbClr val="455a64"/>
                 </a:solidFill>
@@ -39610,7 +40272,7 @@
               <a:t>CA</a:t>
             </a:r>
             <a:r>
-              <a:rPr b="0" lang="ja-JP" sz="1450" strike="noStrike" u="none">
+              <a:rPr b="0" lang="ja-JP" sz="2160" strike="noStrike" u="none">
                 <a:solidFill>
                   <a:srgbClr val="455a64"/>
                 </a:solidFill>
@@ -39621,7 +40283,7 @@
               </a:rPr>
               <a:t>発⾏証明書を使⽤</a:t>
             </a:r>
-            <a:endParaRPr b="0" lang="en-US" sz="1450" strike="noStrike" u="none">
+            <a:endParaRPr b="0" lang="en-US" sz="2160" strike="noStrike" u="none">
               <a:solidFill>
                 <a:srgbClr val="000000"/>
               </a:solidFill>
@@ -39640,8 +40302,8 @@
         </p:nvSpPr>
         <p:spPr>
           <a:xfrm>
-            <a:off x="11837880" y="6394680"/>
-            <a:ext cx="167400" cy="252000"/>
+            <a:off x="11790360" y="6342480"/>
+            <a:ext cx="243360" cy="366120"/>
           </a:xfrm>
           <a:prstGeom prst="rect">
             <a:avLst/>
@@ -39657,7 +40319,7 @@
           </a:bodyPr>
           <a:p>
             <a:r>
-              <a:rPr b="0" lang="en-US" sz="1320" strike="noStrike" u="none">
+              <a:rPr b="0" lang="en-US" sz="1920" strike="noStrike" u="none">
                 <a:solidFill>
                   <a:srgbClr val="455a64"/>
                 </a:solidFill>
@@ -39668,7 +40330,7 @@
               </a:rPr>
               <a:t>9</a:t>
             </a:r>
-            <a:endParaRPr b="0" lang="en-US" sz="1320" strike="noStrike" u="none">
+            <a:endParaRPr b="0" lang="en-US" sz="1920" strike="noStrike" u="none">
               <a:solidFill>
                 <a:srgbClr val="000000"/>
               </a:solidFill>

</xml_diff>